<commit_message>
aggiunta una slide mancante
</commit_message>
<xml_diff>
--- a/Prova_6/Leone_Mastrosimone_PresentazioneProgetto.pptx
+++ b/Prova_6/Leone_Mastrosimone_PresentazioneProgetto.pptx
@@ -34,16 +34,17 @@
     <p:sldId id="282" r:id="rId28"/>
     <p:sldId id="283" r:id="rId29"/>
     <p:sldId id="284" r:id="rId30"/>
-    <p:sldId id="285" r:id="rId31"/>
-    <p:sldId id="286" r:id="rId32"/>
-    <p:sldId id="287" r:id="rId33"/>
-    <p:sldId id="288" r:id="rId34"/>
-    <p:sldId id="289" r:id="rId35"/>
-    <p:sldId id="290" r:id="rId36"/>
-    <p:sldId id="291" r:id="rId37"/>
-    <p:sldId id="292" r:id="rId38"/>
-    <p:sldId id="293" r:id="rId39"/>
-    <p:sldId id="294" r:id="rId40"/>
+    <p:sldId id="295" r:id="rId31"/>
+    <p:sldId id="285" r:id="rId32"/>
+    <p:sldId id="286" r:id="rId33"/>
+    <p:sldId id="287" r:id="rId34"/>
+    <p:sldId id="288" r:id="rId35"/>
+    <p:sldId id="289" r:id="rId36"/>
+    <p:sldId id="290" r:id="rId37"/>
+    <p:sldId id="291" r:id="rId38"/>
+    <p:sldId id="292" r:id="rId39"/>
+    <p:sldId id="293" r:id="rId40"/>
+    <p:sldId id="294" r:id="rId41"/>
   </p:sldIdLst>
   <p:sldSz cx="9144000" cy="6858000" type="screen4x3"/>
   <p:notesSz cx="6858000" cy="9144000"/>
@@ -4003,6 +4004,7 @@
                 <a:solidFill>
                   <a:schemeClr val="tx1"/>
                 </a:solidFill>
+                <a:effectLst/>
                 <a:latin typeface="Times New Roman" panose="02020603050405020304" pitchFamily="18" charset="0"/>
                 <a:cs typeface="Times New Roman" panose="02020603050405020304" pitchFamily="18" charset="0"/>
               </a:rPr>
@@ -4013,6 +4015,7 @@
                 <a:solidFill>
                   <a:schemeClr val="tx1"/>
                 </a:solidFill>
+                <a:effectLst/>
                 <a:latin typeface="Times New Roman" panose="02020603050405020304" pitchFamily="18" charset="0"/>
                 <a:cs typeface="Times New Roman" panose="02020603050405020304" pitchFamily="18" charset="0"/>
               </a:rPr>
@@ -4023,6 +4026,7 @@
                 <a:solidFill>
                   <a:schemeClr val="tx1"/>
                 </a:solidFill>
+                <a:effectLst/>
                 <a:latin typeface="Times New Roman" panose="02020603050405020304" pitchFamily="18" charset="0"/>
                 <a:cs typeface="Times New Roman" panose="02020603050405020304" pitchFamily="18" charset="0"/>
               </a:rPr>
@@ -4032,6 +4036,7 @@
                 <a:solidFill>
                   <a:schemeClr val="tx1"/>
                 </a:solidFill>
+                <a:effectLst/>
                 <a:latin typeface="Times New Roman" panose="02020603050405020304" pitchFamily="18" charset="0"/>
                 <a:cs typeface="Times New Roman" panose="02020603050405020304" pitchFamily="18" charset="0"/>
               </a:rPr>
@@ -4042,6 +4047,7 @@
                 <a:solidFill>
                   <a:schemeClr val="tx1"/>
                 </a:solidFill>
+                <a:effectLst/>
                 <a:latin typeface="Times New Roman" panose="02020603050405020304" pitchFamily="18" charset="0"/>
                 <a:cs typeface="Times New Roman" panose="02020603050405020304" pitchFamily="18" charset="0"/>
               </a:rPr>
@@ -4052,6 +4058,7 @@
                 <a:solidFill>
                   <a:schemeClr val="tx1"/>
                 </a:solidFill>
+                <a:effectLst/>
                 <a:latin typeface="Times New Roman" panose="02020603050405020304" pitchFamily="18" charset="0"/>
                 <a:cs typeface="Times New Roman" panose="02020603050405020304" pitchFamily="18" charset="0"/>
               </a:rPr>
@@ -4062,6 +4069,7 @@
                 <a:solidFill>
                   <a:schemeClr val="tx1"/>
                 </a:solidFill>
+                <a:effectLst/>
                 <a:latin typeface="Times New Roman" panose="02020603050405020304" pitchFamily="18" charset="0"/>
                 <a:cs typeface="Times New Roman" panose="02020603050405020304" pitchFamily="18" charset="0"/>
               </a:rPr>
@@ -4071,6 +4079,7 @@
                 <a:solidFill>
                   <a:schemeClr val="tx1"/>
                 </a:solidFill>
+                <a:effectLst/>
                 <a:latin typeface="Times New Roman" panose="02020603050405020304" pitchFamily="18" charset="0"/>
                 <a:cs typeface="Times New Roman" panose="02020603050405020304" pitchFamily="18" charset="0"/>
               </a:rPr>
@@ -4081,6 +4090,7 @@
                 <a:solidFill>
                   <a:schemeClr val="tx1"/>
                 </a:solidFill>
+                <a:effectLst/>
                 <a:latin typeface="Times New Roman" panose="02020603050405020304" pitchFamily="18" charset="0"/>
                 <a:cs typeface="Times New Roman" panose="02020603050405020304" pitchFamily="18" charset="0"/>
               </a:rPr>
@@ -4091,6 +4101,7 @@
                 <a:solidFill>
                   <a:schemeClr val="tx1"/>
                 </a:solidFill>
+                <a:effectLst/>
                 <a:latin typeface="Times New Roman" panose="02020603050405020304" pitchFamily="18" charset="0"/>
                 <a:cs typeface="Times New Roman" panose="02020603050405020304" pitchFamily="18" charset="0"/>
               </a:rPr>
@@ -10832,6 +10843,365 @@
       </p:grpSpPr>
       <p:sp>
         <p:nvSpPr>
+          <p:cNvPr id="2" name="Titolo 1"/>
+          <p:cNvSpPr>
+            <a:spLocks noGrp="1"/>
+          </p:cNvSpPr>
+          <p:nvPr>
+            <p:ph type="title"/>
+          </p:nvPr>
+        </p:nvSpPr>
+        <p:spPr>
+          <a:xfrm>
+            <a:off x="457200" y="626815"/>
+            <a:ext cx="8229600" cy="493647"/>
+          </a:xfrm>
+        </p:spPr>
+        <p:txBody>
+          <a:bodyPr>
+            <a:normAutofit/>
+          </a:bodyPr>
+          <a:lstStyle/>
+          <a:p>
+            <a:r>
+              <a:rPr lang="it-IT" sz="2800" b="1" dirty="0">
+                <a:latin typeface="Times New Roman" panose="02020603050405020304" pitchFamily="18" charset="0"/>
+                <a:cs typeface="Times New Roman" panose="02020603050405020304" pitchFamily="18" charset="0"/>
+              </a:rPr>
+              <a:t>User </a:t>
+            </a:r>
+            <a:r>
+              <a:rPr lang="it-IT" sz="2800" b="1" dirty="0" err="1">
+                <a:latin typeface="Times New Roman" panose="02020603050405020304" pitchFamily="18" charset="0"/>
+                <a:cs typeface="Times New Roman" panose="02020603050405020304" pitchFamily="18" charset="0"/>
+              </a:rPr>
+              <a:t>testing</a:t>
+            </a:r>
+            <a:r>
+              <a:rPr lang="it-IT" sz="2800" b="1" dirty="0">
+                <a:latin typeface="Times New Roman" panose="02020603050405020304" pitchFamily="18" charset="0"/>
+                <a:cs typeface="Times New Roman" panose="02020603050405020304" pitchFamily="18" charset="0"/>
+              </a:rPr>
+              <a:t> – </a:t>
+            </a:r>
+            <a:r>
+              <a:rPr lang="it-IT" sz="2800" b="1" i="1" dirty="0" err="1">
+                <a:latin typeface="Times New Roman" panose="02020603050405020304" pitchFamily="18" charset="0"/>
+                <a:cs typeface="Times New Roman" panose="02020603050405020304" pitchFamily="18" charset="0"/>
+              </a:rPr>
+              <a:t>During</a:t>
+            </a:r>
+            <a:r>
+              <a:rPr lang="it-IT" sz="2800" b="1" i="1" dirty="0">
+                <a:latin typeface="Times New Roman" panose="02020603050405020304" pitchFamily="18" charset="0"/>
+                <a:cs typeface="Times New Roman" panose="02020603050405020304" pitchFamily="18" charset="0"/>
+              </a:rPr>
+              <a:t> the test</a:t>
+            </a:r>
+            <a:endParaRPr lang="it-IT" sz="2800" dirty="0"/>
+          </a:p>
+        </p:txBody>
+      </p:sp>
+      <p:sp>
+        <p:nvSpPr>
+          <p:cNvPr id="3" name="Segnaposto contenuto 2"/>
+          <p:cNvSpPr>
+            <a:spLocks noGrp="1"/>
+          </p:cNvSpPr>
+          <p:nvPr>
+            <p:ph idx="1"/>
+          </p:nvPr>
+        </p:nvSpPr>
+        <p:spPr>
+          <a:xfrm>
+            <a:off x="457200" y="1429555"/>
+            <a:ext cx="8229600" cy="4895045"/>
+          </a:xfrm>
+        </p:spPr>
+        <p:txBody>
+          <a:bodyPr>
+            <a:normAutofit/>
+          </a:bodyPr>
+          <a:lstStyle/>
+          <a:p>
+            <a:pPr marL="0" indent="0" algn="ctr">
+              <a:buNone/>
+            </a:pPr>
+            <a:r>
+              <a:rPr lang="it-IT" sz="2500" b="1" dirty="0" smtClean="0">
+                <a:latin typeface="Times New Roman" panose="02020603050405020304" pitchFamily="18" charset="0"/>
+                <a:cs typeface="Times New Roman" panose="02020603050405020304" pitchFamily="18" charset="0"/>
+              </a:rPr>
+              <a:t>Task </a:t>
+            </a:r>
+            <a:r>
+              <a:rPr lang="it-IT" sz="2500" b="1" dirty="0">
+                <a:latin typeface="Times New Roman" panose="02020603050405020304" pitchFamily="18" charset="0"/>
+                <a:cs typeface="Times New Roman" panose="02020603050405020304" pitchFamily="18" charset="0"/>
+              </a:rPr>
+              <a:t>7 – </a:t>
+            </a:r>
+            <a:r>
+              <a:rPr lang="it-IT" sz="2500" b="1" dirty="0" err="1" smtClean="0">
+                <a:latin typeface="Times New Roman" panose="02020603050405020304" pitchFamily="18" charset="0"/>
+                <a:cs typeface="Times New Roman" panose="02020603050405020304" pitchFamily="18" charset="0"/>
+              </a:rPr>
+              <a:t>Forgot</a:t>
+            </a:r>
+            <a:r>
+              <a:rPr lang="it-IT" sz="2500" b="1" dirty="0" smtClean="0">
+                <a:latin typeface="Times New Roman" panose="02020603050405020304" pitchFamily="18" charset="0"/>
+                <a:cs typeface="Times New Roman" panose="02020603050405020304" pitchFamily="18" charset="0"/>
+              </a:rPr>
+              <a:t> Password </a:t>
+            </a:r>
+            <a:r>
+              <a:rPr lang="it-IT" sz="2500" b="1" dirty="0">
+                <a:latin typeface="Times New Roman" panose="02020603050405020304" pitchFamily="18" charset="0"/>
+                <a:cs typeface="Times New Roman" panose="02020603050405020304" pitchFamily="18" charset="0"/>
+              </a:rPr>
+              <a:t>e</a:t>
+            </a:r>
+            <a:r>
+              <a:rPr lang="it-IT" sz="2500" b="1" dirty="0" smtClean="0">
+                <a:latin typeface="Times New Roman" panose="02020603050405020304" pitchFamily="18" charset="0"/>
+                <a:cs typeface="Times New Roman" panose="02020603050405020304" pitchFamily="18" charset="0"/>
+              </a:rPr>
+              <a:t> Login</a:t>
+            </a:r>
+          </a:p>
+          <a:p>
+            <a:pPr marL="0" indent="0" algn="ctr">
+              <a:buNone/>
+            </a:pPr>
+            <a:endParaRPr lang="it-IT" sz="2500" dirty="0">
+              <a:latin typeface="Times New Roman" panose="02020603050405020304" pitchFamily="18" charset="0"/>
+              <a:cs typeface="Times New Roman" panose="02020603050405020304" pitchFamily="18" charset="0"/>
+            </a:endParaRPr>
+          </a:p>
+          <a:p>
+            <a:pPr marL="457200" lvl="0" indent="-457200">
+              <a:buClrTx/>
+              <a:buFont typeface="+mj-lt"/>
+              <a:buAutoNum type="arabicPeriod"/>
+            </a:pPr>
+            <a:r>
+              <a:rPr lang="it-IT" sz="2000" dirty="0">
+                <a:latin typeface="Times New Roman" panose="02020603050405020304" pitchFamily="18" charset="0"/>
+                <a:cs typeface="Times New Roman" panose="02020603050405020304" pitchFamily="18" charset="0"/>
+              </a:rPr>
+              <a:t>Dalla Home aprire il menù a tendina e cliccare su “</a:t>
+            </a:r>
+            <a:r>
+              <a:rPr lang="it-IT" sz="2000" dirty="0" err="1">
+                <a:latin typeface="Times New Roman" panose="02020603050405020304" pitchFamily="18" charset="0"/>
+                <a:cs typeface="Times New Roman" panose="02020603050405020304" pitchFamily="18" charset="0"/>
+              </a:rPr>
+              <a:t>Logout</a:t>
+            </a:r>
+            <a:r>
+              <a:rPr lang="it-IT" sz="2000" dirty="0">
+                <a:latin typeface="Times New Roman" panose="02020603050405020304" pitchFamily="18" charset="0"/>
+                <a:cs typeface="Times New Roman" panose="02020603050405020304" pitchFamily="18" charset="0"/>
+              </a:rPr>
+              <a:t>”;</a:t>
+            </a:r>
+          </a:p>
+          <a:p>
+            <a:pPr marL="457200" lvl="0" indent="-457200">
+              <a:buClrTx/>
+              <a:buFont typeface="+mj-lt"/>
+              <a:buAutoNum type="arabicPeriod"/>
+            </a:pPr>
+            <a:r>
+              <a:rPr lang="it-IT" sz="2000" dirty="0">
+                <a:latin typeface="Times New Roman" panose="02020603050405020304" pitchFamily="18" charset="0"/>
+                <a:cs typeface="Times New Roman" panose="02020603050405020304" pitchFamily="18" charset="0"/>
+              </a:rPr>
+              <a:t>Si verrà reindirizzati nella pagina di presentazione dell’</a:t>
+            </a:r>
+            <a:r>
+              <a:rPr lang="it-IT" sz="2000" dirty="0" err="1">
+                <a:latin typeface="Times New Roman" panose="02020603050405020304" pitchFamily="18" charset="0"/>
+                <a:cs typeface="Times New Roman" panose="02020603050405020304" pitchFamily="18" charset="0"/>
+              </a:rPr>
+              <a:t>app</a:t>
+            </a:r>
+            <a:r>
+              <a:rPr lang="it-IT" sz="2000" dirty="0">
+                <a:latin typeface="Times New Roman" panose="02020603050405020304" pitchFamily="18" charset="0"/>
+                <a:cs typeface="Times New Roman" panose="02020603050405020304" pitchFamily="18" charset="0"/>
+              </a:rPr>
+              <a:t>;</a:t>
+            </a:r>
+          </a:p>
+          <a:p>
+            <a:pPr marL="457200" lvl="0" indent="-457200">
+              <a:buClrTx/>
+              <a:buFont typeface="+mj-lt"/>
+              <a:buAutoNum type="arabicPeriod"/>
+            </a:pPr>
+            <a:r>
+              <a:rPr lang="it-IT" sz="2000" dirty="0">
+                <a:latin typeface="Times New Roman" panose="02020603050405020304" pitchFamily="18" charset="0"/>
+                <a:cs typeface="Times New Roman" panose="02020603050405020304" pitchFamily="18" charset="0"/>
+              </a:rPr>
+              <a:t>Cliccare sul pulsante “Login”;</a:t>
+            </a:r>
+          </a:p>
+          <a:p>
+            <a:pPr marL="457200" lvl="0" indent="-457200">
+              <a:buClrTx/>
+              <a:buFont typeface="+mj-lt"/>
+              <a:buAutoNum type="arabicPeriod"/>
+            </a:pPr>
+            <a:r>
+              <a:rPr lang="it-IT" sz="2000" dirty="0">
+                <a:latin typeface="Times New Roman" panose="02020603050405020304" pitchFamily="18" charset="0"/>
+                <a:cs typeface="Times New Roman" panose="02020603050405020304" pitchFamily="18" charset="0"/>
+              </a:rPr>
+              <a:t>Cliccare su “</a:t>
+            </a:r>
+            <a:r>
+              <a:rPr lang="it-IT" sz="2000" dirty="0" err="1">
+                <a:latin typeface="Times New Roman" panose="02020603050405020304" pitchFamily="18" charset="0"/>
+                <a:cs typeface="Times New Roman" panose="02020603050405020304" pitchFamily="18" charset="0"/>
+              </a:rPr>
+              <a:t>Forgot</a:t>
+            </a:r>
+            <a:r>
+              <a:rPr lang="it-IT" sz="2000" dirty="0">
+                <a:latin typeface="Times New Roman" panose="02020603050405020304" pitchFamily="18" charset="0"/>
+                <a:cs typeface="Times New Roman" panose="02020603050405020304" pitchFamily="18" charset="0"/>
+              </a:rPr>
+              <a:t> </a:t>
+            </a:r>
+            <a:r>
+              <a:rPr lang="it-IT" sz="2000" dirty="0" err="1">
+                <a:latin typeface="Times New Roman" panose="02020603050405020304" pitchFamily="18" charset="0"/>
+                <a:cs typeface="Times New Roman" panose="02020603050405020304" pitchFamily="18" charset="0"/>
+              </a:rPr>
+              <a:t>you</a:t>
+            </a:r>
+            <a:r>
+              <a:rPr lang="it-IT" sz="2000" dirty="0">
+                <a:latin typeface="Times New Roman" panose="02020603050405020304" pitchFamily="18" charset="0"/>
+                <a:cs typeface="Times New Roman" panose="02020603050405020304" pitchFamily="18" charset="0"/>
+              </a:rPr>
+              <a:t> password?”</a:t>
+            </a:r>
+          </a:p>
+          <a:p>
+            <a:pPr marL="457200" lvl="0" indent="-457200">
+              <a:buClrTx/>
+              <a:buFont typeface="+mj-lt"/>
+              <a:buAutoNum type="arabicPeriod"/>
+            </a:pPr>
+            <a:r>
+              <a:rPr lang="it-IT" sz="2000" dirty="0">
+                <a:latin typeface="Times New Roman" panose="02020603050405020304" pitchFamily="18" charset="0"/>
+                <a:cs typeface="Times New Roman" panose="02020603050405020304" pitchFamily="18" charset="0"/>
+              </a:rPr>
+              <a:t>Compilare i campi richiesti e cliccare su “Reset Password”;</a:t>
+            </a:r>
+          </a:p>
+          <a:p>
+            <a:pPr marL="457200" lvl="0" indent="-457200">
+              <a:buClrTx/>
+              <a:buFont typeface="+mj-lt"/>
+              <a:buAutoNum type="arabicPeriod"/>
+            </a:pPr>
+            <a:r>
+              <a:rPr lang="it-IT" sz="2000" dirty="0">
+                <a:latin typeface="Times New Roman" panose="02020603050405020304" pitchFamily="18" charset="0"/>
+                <a:cs typeface="Times New Roman" panose="02020603050405020304" pitchFamily="18" charset="0"/>
+              </a:rPr>
+              <a:t>Se l’operazione è andata a buon fine si verrà indirizzati nella pagina di Login;</a:t>
+            </a:r>
+          </a:p>
+          <a:p>
+            <a:pPr marL="457200" lvl="0" indent="-457200">
+              <a:buClr>
+                <a:schemeClr val="tx1"/>
+              </a:buClr>
+              <a:buFont typeface="+mj-lt"/>
+              <a:buAutoNum type="arabicPeriod"/>
+            </a:pPr>
+            <a:r>
+              <a:rPr lang="it-IT" sz="2000" dirty="0">
+                <a:latin typeface="Times New Roman" panose="02020603050405020304" pitchFamily="18" charset="0"/>
+                <a:cs typeface="Times New Roman" panose="02020603050405020304" pitchFamily="18" charset="0"/>
+              </a:rPr>
+              <a:t>Compilare le </a:t>
+            </a:r>
+            <a:r>
+              <a:rPr lang="it-IT" sz="2000" dirty="0" err="1">
+                <a:latin typeface="Times New Roman" panose="02020603050405020304" pitchFamily="18" charset="0"/>
+                <a:cs typeface="Times New Roman" panose="02020603050405020304" pitchFamily="18" charset="0"/>
+              </a:rPr>
+              <a:t>form</a:t>
+            </a:r>
+            <a:r>
+              <a:rPr lang="it-IT" sz="2000" dirty="0">
+                <a:latin typeface="Times New Roman" panose="02020603050405020304" pitchFamily="18" charset="0"/>
+                <a:cs typeface="Times New Roman" panose="02020603050405020304" pitchFamily="18" charset="0"/>
+              </a:rPr>
+              <a:t> richieste e cliccare su Login;</a:t>
+            </a:r>
+          </a:p>
+          <a:p>
+            <a:pPr marL="457200" lvl="0" indent="-457200">
+              <a:buClr>
+                <a:schemeClr val="tx1"/>
+              </a:buClr>
+              <a:buFont typeface="+mj-lt"/>
+              <a:buAutoNum type="arabicPeriod"/>
+            </a:pPr>
+            <a:r>
+              <a:rPr lang="it-IT" sz="2000" dirty="0">
+                <a:latin typeface="Times New Roman" panose="02020603050405020304" pitchFamily="18" charset="0"/>
+                <a:cs typeface="Times New Roman" panose="02020603050405020304" pitchFamily="18" charset="0"/>
+              </a:rPr>
+              <a:t>Si verrà indirizzati nella Home page nel caso in cui i dati sono stati inseriti correttamente. </a:t>
+            </a:r>
+          </a:p>
+          <a:p>
+            <a:endParaRPr lang="it-IT" dirty="0"/>
+          </a:p>
+        </p:txBody>
+      </p:sp>
+    </p:spTree>
+    <p:extLst>
+      <p:ext uri="{BB962C8B-B14F-4D97-AF65-F5344CB8AC3E}">
+        <p14:creationId xmlns:p14="http://schemas.microsoft.com/office/powerpoint/2010/main" val="2428663034"/>
+      </p:ext>
+    </p:extLst>
+  </p:cSld>
+  <p:clrMapOvr>
+    <a:masterClrMapping/>
+  </p:clrMapOvr>
+</p:sld>
+</file>
+
+<file path=ppt/slides/slide31.xml><?xml version="1.0" encoding="utf-8"?>
+<p:sld xmlns:a="http://schemas.openxmlformats.org/drawingml/2006/main" xmlns:r="http://schemas.openxmlformats.org/officeDocument/2006/relationships" xmlns:p="http://schemas.openxmlformats.org/presentationml/2006/main">
+  <p:cSld>
+    <p:spTree>
+      <p:nvGrpSpPr>
+        <p:cNvPr id="1" name=""/>
+        <p:cNvGrpSpPr/>
+        <p:nvPr/>
+      </p:nvGrpSpPr>
+      <p:grpSpPr>
+        <a:xfrm>
+          <a:off x="0" y="0"/>
+          <a:ext cx="0" cy="0"/>
+          <a:chOff x="0" y="0"/>
+          <a:chExt cx="0" cy="0"/>
+        </a:xfrm>
+      </p:grpSpPr>
+      <p:sp>
+        <p:nvSpPr>
           <p:cNvPr id="5" name="Titolo 1"/>
           <p:cNvSpPr>
             <a:spLocks noGrp="1"/>
@@ -11096,184 +11466,6 @@
 </p:sld>
 </file>
 
-<file path=ppt/slides/slide31.xml><?xml version="1.0" encoding="utf-8"?>
-<p:sld xmlns:a="http://schemas.openxmlformats.org/drawingml/2006/main" xmlns:r="http://schemas.openxmlformats.org/officeDocument/2006/relationships" xmlns:p="http://schemas.openxmlformats.org/presentationml/2006/main">
-  <p:cSld>
-    <p:spTree>
-      <p:nvGrpSpPr>
-        <p:cNvPr id="1" name=""/>
-        <p:cNvGrpSpPr/>
-        <p:nvPr/>
-      </p:nvGrpSpPr>
-      <p:grpSpPr>
-        <a:xfrm>
-          <a:off x="0" y="0"/>
-          <a:ext cx="0" cy="0"/>
-          <a:chOff x="0" y="0"/>
-          <a:chExt cx="0" cy="0"/>
-        </a:xfrm>
-      </p:grpSpPr>
-      <p:sp>
-        <p:nvSpPr>
-          <p:cNvPr id="5" name="Titolo 1"/>
-          <p:cNvSpPr>
-            <a:spLocks noGrp="1"/>
-          </p:cNvSpPr>
-          <p:nvPr>
-            <p:ph type="title"/>
-          </p:nvPr>
-        </p:nvSpPr>
-        <p:spPr>
-          <a:xfrm>
-            <a:off x="628650" y="444137"/>
-            <a:ext cx="7886700" cy="653143"/>
-          </a:xfrm>
-        </p:spPr>
-        <p:txBody>
-          <a:bodyPr>
-            <a:normAutofit/>
-          </a:bodyPr>
-          <a:lstStyle/>
-          <a:p>
-            <a:r>
-              <a:rPr lang="it-IT" sz="2800" b="1" dirty="0" err="1" smtClean="0">
-                <a:latin typeface="Times New Roman" panose="02020603050405020304" pitchFamily="18" charset="0"/>
-                <a:cs typeface="Times New Roman" panose="02020603050405020304" pitchFamily="18" charset="0"/>
-              </a:rPr>
-              <a:t>User</a:t>
-            </a:r>
-            <a:r>
-              <a:rPr lang="it-IT" sz="2800" b="1" dirty="0" smtClean="0">
-                <a:latin typeface="Times New Roman" panose="02020603050405020304" pitchFamily="18" charset="0"/>
-                <a:cs typeface="Times New Roman" panose="02020603050405020304" pitchFamily="18" charset="0"/>
-              </a:rPr>
-              <a:t> </a:t>
-            </a:r>
-            <a:r>
-              <a:rPr lang="it-IT" sz="2800" b="1" dirty="0" err="1" smtClean="0">
-                <a:latin typeface="Times New Roman" panose="02020603050405020304" pitchFamily="18" charset="0"/>
-                <a:cs typeface="Times New Roman" panose="02020603050405020304" pitchFamily="18" charset="0"/>
-              </a:rPr>
-              <a:t>testing</a:t>
-            </a:r>
-            <a:r>
-              <a:rPr lang="it-IT" sz="2800" b="1" dirty="0" smtClean="0">
-                <a:latin typeface="Times New Roman" panose="02020603050405020304" pitchFamily="18" charset="0"/>
-                <a:cs typeface="Times New Roman" panose="02020603050405020304" pitchFamily="18" charset="0"/>
-              </a:rPr>
-              <a:t> – </a:t>
-            </a:r>
-            <a:r>
-              <a:rPr lang="it-IT" sz="2800" b="1" i="1" dirty="0" err="1" smtClean="0">
-                <a:latin typeface="Times New Roman" panose="02020603050405020304" pitchFamily="18" charset="0"/>
-                <a:cs typeface="Times New Roman" panose="02020603050405020304" pitchFamily="18" charset="0"/>
-              </a:rPr>
-              <a:t>During</a:t>
-            </a:r>
-            <a:r>
-              <a:rPr lang="it-IT" sz="2800" b="1" i="1" dirty="0" smtClean="0">
-                <a:latin typeface="Times New Roman" panose="02020603050405020304" pitchFamily="18" charset="0"/>
-                <a:cs typeface="Times New Roman" panose="02020603050405020304" pitchFamily="18" charset="0"/>
-              </a:rPr>
-              <a:t> the test</a:t>
-            </a:r>
-            <a:endParaRPr lang="it-IT" sz="2800" i="1" dirty="0"/>
-          </a:p>
-        </p:txBody>
-      </p:sp>
-      <p:sp>
-        <p:nvSpPr>
-          <p:cNvPr id="8" name="Segnaposto contenuto 2"/>
-          <p:cNvSpPr txBox="1">
-            <a:spLocks/>
-          </p:cNvSpPr>
-          <p:nvPr/>
-        </p:nvSpPr>
-        <p:spPr>
-          <a:xfrm>
-            <a:off x="628650" y="1254036"/>
-            <a:ext cx="7886700" cy="627016"/>
-          </a:xfrm>
-          <a:prstGeom prst="rect">
-            <a:avLst/>
-          </a:prstGeom>
-        </p:spPr>
-        <p:txBody>
-          <a:bodyPr vert="horz" lIns="91440" tIns="45720" rIns="91440" bIns="45720" rtlCol="0">
-            <a:normAutofit/>
-          </a:bodyPr>
-          <a:lstStyle/>
-          <a:p>
-            <a:pPr lvl="0" algn="ctr">
-              <a:lnSpc>
-                <a:spcPct val="120000"/>
-              </a:lnSpc>
-              <a:spcBef>
-                <a:spcPts val="1000"/>
-              </a:spcBef>
-            </a:pPr>
-            <a:r>
-              <a:rPr lang="it-IT" sz="2500" b="1" dirty="0" err="1" smtClean="0">
-                <a:latin typeface="Times New Roman" panose="02020603050405020304" pitchFamily="18" charset="0"/>
-                <a:cs typeface="Times New Roman" panose="02020603050405020304" pitchFamily="18" charset="0"/>
-              </a:rPr>
-              <a:t>Thinking</a:t>
-            </a:r>
-            <a:r>
-              <a:rPr lang="it-IT" sz="2500" b="1" dirty="0" smtClean="0">
-                <a:latin typeface="Times New Roman" panose="02020603050405020304" pitchFamily="18" charset="0"/>
-                <a:cs typeface="Times New Roman" panose="02020603050405020304" pitchFamily="18" charset="0"/>
-              </a:rPr>
-              <a:t> </a:t>
-            </a:r>
-            <a:r>
-              <a:rPr lang="it-IT" sz="2500" b="1" dirty="0" err="1" smtClean="0">
-                <a:latin typeface="Times New Roman" panose="02020603050405020304" pitchFamily="18" charset="0"/>
-                <a:cs typeface="Times New Roman" panose="02020603050405020304" pitchFamily="18" charset="0"/>
-              </a:rPr>
-              <a:t>Aloud</a:t>
-            </a:r>
-            <a:r>
-              <a:rPr lang="it-IT" sz="2500" b="1" dirty="0" smtClean="0">
-                <a:latin typeface="Times New Roman" panose="02020603050405020304" pitchFamily="18" charset="0"/>
-                <a:cs typeface="Times New Roman" panose="02020603050405020304" pitchFamily="18" charset="0"/>
-              </a:rPr>
-              <a:t> – Tester </a:t>
-            </a:r>
-            <a:r>
-              <a:rPr lang="it-IT" sz="2500" b="1" dirty="0" err="1" smtClean="0">
-                <a:latin typeface="Times New Roman" panose="02020603050405020304" pitchFamily="18" charset="0"/>
-                <a:cs typeface="Times New Roman" panose="02020603050405020304" pitchFamily="18" charset="0"/>
-              </a:rPr>
-              <a:t>n°</a:t>
-            </a:r>
-            <a:r>
-              <a:rPr lang="it-IT" sz="2500" b="1" dirty="0" smtClean="0">
-                <a:latin typeface="Times New Roman" panose="02020603050405020304" pitchFamily="18" charset="0"/>
-                <a:cs typeface="Times New Roman" panose="02020603050405020304" pitchFamily="18" charset="0"/>
-              </a:rPr>
-              <a:t> 2 ()</a:t>
-            </a:r>
-            <a:endParaRPr lang="it-IT" sz="2500" dirty="0" smtClean="0">
-              <a:latin typeface="Times New Roman" panose="02020603050405020304" pitchFamily="18" charset="0"/>
-              <a:cs typeface="Times New Roman" panose="02020603050405020304" pitchFamily="18" charset="0"/>
-            </a:endParaRPr>
-          </a:p>
-        </p:txBody>
-      </p:sp>
-    </p:spTree>
-    <p:extLst>
-      <p:ext uri="{BB962C8B-B14F-4D97-AF65-F5344CB8AC3E}">
-        <p14:creationId xmlns:p14="http://schemas.microsoft.com/office/powerpoint/2010/main" val="2442419145"/>
-      </p:ext>
-    </p:extLst>
-  </p:cSld>
-  <p:clrMapOvr>
-    <a:masterClrMapping/>
-  </p:clrMapOvr>
-</p:sld>
-</file>
-
 <file path=ppt/slides/slide32.xml><?xml version="1.0" encoding="utf-8"?>
 <p:sld xmlns:a="http://schemas.openxmlformats.org/drawingml/2006/main" xmlns:r="http://schemas.openxmlformats.org/officeDocument/2006/relationships" xmlns:p="http://schemas.openxmlformats.org/presentationml/2006/main">
   <p:cSld>
@@ -11430,7 +11622,7 @@
                 <a:latin typeface="Times New Roman" panose="02020603050405020304" pitchFamily="18" charset="0"/>
                 <a:cs typeface="Times New Roman" panose="02020603050405020304" pitchFamily="18" charset="0"/>
               </a:rPr>
-              <a:t> 3 ()</a:t>
+              <a:t> 2 ()</a:t>
             </a:r>
             <a:endParaRPr lang="it-IT" sz="2500" dirty="0" smtClean="0">
               <a:latin typeface="Times New Roman" panose="02020603050405020304" pitchFamily="18" charset="0"/>
@@ -11524,7 +11716,7 @@
                 <a:latin typeface="Times New Roman" panose="02020603050405020304" pitchFamily="18" charset="0"/>
                 <a:cs typeface="Times New Roman" panose="02020603050405020304" pitchFamily="18" charset="0"/>
               </a:rPr>
-              <a:t>After</a:t>
+              <a:t>During</a:t>
             </a:r>
             <a:r>
               <a:rPr lang="it-IT" sz="2800" b="1" i="1" dirty="0" smtClean="0">
@@ -11547,8 +11739,8 @@
         </p:nvSpPr>
         <p:spPr>
           <a:xfrm>
-            <a:off x="628650" y="1254034"/>
-            <a:ext cx="7886700" cy="5301311"/>
+            <a:off x="628650" y="1254036"/>
+            <a:ext cx="7886700" cy="627016"/>
           </a:xfrm>
           <a:prstGeom prst="rect">
             <a:avLst/>
@@ -11569,132 +11761,48 @@
               </a:spcBef>
             </a:pPr>
             <a:r>
+              <a:rPr lang="it-IT" sz="2500" b="1" dirty="0" err="1" smtClean="0">
+                <a:latin typeface="Times New Roman" panose="02020603050405020304" pitchFamily="18" charset="0"/>
+                <a:cs typeface="Times New Roman" panose="02020603050405020304" pitchFamily="18" charset="0"/>
+              </a:rPr>
+              <a:t>Thinking</a:t>
+            </a:r>
+            <a:r>
               <a:rPr lang="it-IT" sz="2500" b="1" dirty="0" smtClean="0">
                 <a:latin typeface="Times New Roman" panose="02020603050405020304" pitchFamily="18" charset="0"/>
                 <a:cs typeface="Times New Roman" panose="02020603050405020304" pitchFamily="18" charset="0"/>
               </a:rPr>
-              <a:t>Task 1 – </a:t>
+              <a:t> </a:t>
             </a:r>
             <a:r>
               <a:rPr lang="it-IT" sz="2500" b="1" dirty="0" err="1" smtClean="0">
                 <a:latin typeface="Times New Roman" panose="02020603050405020304" pitchFamily="18" charset="0"/>
                 <a:cs typeface="Times New Roman" panose="02020603050405020304" pitchFamily="18" charset="0"/>
               </a:rPr>
-              <a:t>Sign</a:t>
+              <a:t>Aloud</a:t>
             </a:r>
             <a:r>
               <a:rPr lang="it-IT" sz="2500" b="1" dirty="0" smtClean="0">
                 <a:latin typeface="Times New Roman" panose="02020603050405020304" pitchFamily="18" charset="0"/>
                 <a:cs typeface="Times New Roman" panose="02020603050405020304" pitchFamily="18" charset="0"/>
               </a:rPr>
-              <a:t> up</a:t>
+              <a:t> – Tester </a:t>
+            </a:r>
+            <a:r>
+              <a:rPr lang="it-IT" sz="2500" b="1" dirty="0" err="1" smtClean="0">
+                <a:latin typeface="Times New Roman" panose="02020603050405020304" pitchFamily="18" charset="0"/>
+                <a:cs typeface="Times New Roman" panose="02020603050405020304" pitchFamily="18" charset="0"/>
+              </a:rPr>
+              <a:t>n°</a:t>
+            </a:r>
+            <a:r>
+              <a:rPr lang="it-IT" sz="2500" b="1" dirty="0" smtClean="0">
+                <a:latin typeface="Times New Roman" panose="02020603050405020304" pitchFamily="18" charset="0"/>
+                <a:cs typeface="Times New Roman" panose="02020603050405020304" pitchFamily="18" charset="0"/>
+              </a:rPr>
+              <a:t> 3 ()</a:t>
             </a:r>
             <a:endParaRPr lang="it-IT" sz="2500" dirty="0" smtClean="0">
-              <a:latin typeface="Times New Roman" panose="02020603050405020304" pitchFamily="18" charset="0"/>
-              <a:cs typeface="Times New Roman" panose="02020603050405020304" pitchFamily="18" charset="0"/>
-            </a:endParaRPr>
-          </a:p>
-          <a:p>
-            <a:pPr algn="just"/>
-            <a:endParaRPr lang="it-IT" sz="2000" dirty="0" smtClean="0">
-              <a:latin typeface="Times New Roman" panose="02020603050405020304" pitchFamily="18" charset="0"/>
-              <a:cs typeface="Times New Roman" panose="02020603050405020304" pitchFamily="18" charset="0"/>
-            </a:endParaRPr>
-          </a:p>
-          <a:p>
-            <a:r>
-              <a:rPr lang="it-IT" sz="2600" dirty="0" smtClean="0"/>
-              <a:t> </a:t>
-            </a:r>
-          </a:p>
-          <a:p>
-            <a:pPr marL="457200" lvl="0" indent="-457200">
-              <a:buFont typeface="+mj-lt"/>
-              <a:buAutoNum type="arabicPeriod"/>
-            </a:pPr>
-            <a:r>
-              <a:rPr lang="it-IT" sz="2000" dirty="0" smtClean="0">
-                <a:latin typeface="Times New Roman" panose="02020603050405020304" pitchFamily="18" charset="0"/>
-                <a:cs typeface="Times New Roman" panose="02020603050405020304" pitchFamily="18" charset="0"/>
-              </a:rPr>
-              <a:t>Intuitività della schermata.</a:t>
-            </a:r>
-          </a:p>
-          <a:p>
-            <a:r>
-              <a:rPr lang="it-IT" sz="2000" dirty="0" smtClean="0">
-                <a:latin typeface="Times New Roman" panose="02020603050405020304" pitchFamily="18" charset="0"/>
-                <a:cs typeface="Times New Roman" panose="02020603050405020304" pitchFamily="18" charset="0"/>
-              </a:rPr>
-              <a:t>			1    2    3    4    5</a:t>
-            </a:r>
-          </a:p>
-          <a:p>
-            <a:pPr marL="457200" lvl="0" indent="-457200">
-              <a:buFont typeface="+mj-lt"/>
-              <a:buAutoNum type="arabicPeriod" startAt="2"/>
-            </a:pPr>
-            <a:r>
-              <a:rPr lang="it-IT" sz="2000" dirty="0" smtClean="0">
-                <a:latin typeface="Times New Roman" panose="02020603050405020304" pitchFamily="18" charset="0"/>
-                <a:cs typeface="Times New Roman" panose="02020603050405020304" pitchFamily="18" charset="0"/>
-              </a:rPr>
-              <a:t>Si capisce sempre quali operazioni effettuare di volta in volta.</a:t>
-            </a:r>
-          </a:p>
-          <a:p>
-            <a:r>
-              <a:rPr lang="it-IT" sz="2000" dirty="0" smtClean="0">
-                <a:latin typeface="Times New Roman" panose="02020603050405020304" pitchFamily="18" charset="0"/>
-                <a:cs typeface="Times New Roman" panose="02020603050405020304" pitchFamily="18" charset="0"/>
-              </a:rPr>
-              <a:t>			1    2    3    4    5</a:t>
-            </a:r>
-          </a:p>
-          <a:p>
-            <a:pPr marL="457200" lvl="0" indent="-457200">
-              <a:buFont typeface="+mj-lt"/>
-              <a:buAutoNum type="arabicPeriod" startAt="3"/>
-            </a:pPr>
-            <a:r>
-              <a:rPr lang="it-IT" sz="2000" dirty="0" smtClean="0">
-                <a:latin typeface="Times New Roman" panose="02020603050405020304" pitchFamily="18" charset="0"/>
-                <a:cs typeface="Times New Roman" panose="02020603050405020304" pitchFamily="18" charset="0"/>
-              </a:rPr>
-              <a:t>Si riesce a capire come passare da una schermata all’altra.</a:t>
-            </a:r>
-          </a:p>
-          <a:p>
-            <a:r>
-              <a:rPr lang="it-IT" sz="2000" dirty="0" smtClean="0">
-                <a:latin typeface="Times New Roman" panose="02020603050405020304" pitchFamily="18" charset="0"/>
-                <a:cs typeface="Times New Roman" panose="02020603050405020304" pitchFamily="18" charset="0"/>
-              </a:rPr>
-              <a:t>			1    2    3    4    5</a:t>
-            </a:r>
-          </a:p>
-          <a:p>
-            <a:pPr marL="457200" lvl="0" indent="-457200">
-              <a:buFont typeface="+mj-lt"/>
-              <a:buAutoNum type="arabicPeriod" startAt="4"/>
-            </a:pPr>
-            <a:r>
-              <a:rPr lang="it-IT" sz="2000" dirty="0" smtClean="0">
-                <a:latin typeface="Times New Roman" panose="02020603050405020304" pitchFamily="18" charset="0"/>
-                <a:cs typeface="Times New Roman" panose="02020603050405020304" pitchFamily="18" charset="0"/>
-              </a:rPr>
-              <a:t>È sempre possibile capire e correggere gli errori commessi.</a:t>
-            </a:r>
-          </a:p>
-          <a:p>
-            <a:r>
-              <a:rPr lang="it-IT" sz="2000" dirty="0" smtClean="0">
-                <a:latin typeface="Times New Roman" panose="02020603050405020304" pitchFamily="18" charset="0"/>
-                <a:cs typeface="Times New Roman" panose="02020603050405020304" pitchFamily="18" charset="0"/>
-              </a:rPr>
-              <a:t>			1    2    3    4    5</a:t>
-            </a:r>
-            <a:endParaRPr lang="it-IT" sz="2000" dirty="0">
               <a:latin typeface="Times New Roman" panose="02020603050405020304" pitchFamily="18" charset="0"/>
               <a:cs typeface="Times New Roman" panose="02020603050405020304" pitchFamily="18" charset="0"/>
             </a:endParaRPr>
@@ -11835,7 +11943,21 @@
                 <a:latin typeface="Times New Roman" panose="02020603050405020304" pitchFamily="18" charset="0"/>
                 <a:cs typeface="Times New Roman" panose="02020603050405020304" pitchFamily="18" charset="0"/>
               </a:rPr>
-              <a:t>Task 2 – Selezionare un obiettivo</a:t>
+              <a:t>Task 1 – </a:t>
+            </a:r>
+            <a:r>
+              <a:rPr lang="it-IT" sz="2500" b="1" dirty="0" err="1" smtClean="0">
+                <a:latin typeface="Times New Roman" panose="02020603050405020304" pitchFamily="18" charset="0"/>
+                <a:cs typeface="Times New Roman" panose="02020603050405020304" pitchFamily="18" charset="0"/>
+              </a:rPr>
+              <a:t>Sign</a:t>
+            </a:r>
+            <a:r>
+              <a:rPr lang="it-IT" sz="2500" b="1" dirty="0" smtClean="0">
+                <a:latin typeface="Times New Roman" panose="02020603050405020304" pitchFamily="18" charset="0"/>
+                <a:cs typeface="Times New Roman" panose="02020603050405020304" pitchFamily="18" charset="0"/>
+              </a:rPr>
+              <a:t> up</a:t>
             </a:r>
             <a:endParaRPr lang="it-IT" sz="2500" dirty="0" smtClean="0">
               <a:latin typeface="Times New Roman" panose="02020603050405020304" pitchFamily="18" charset="0"/>
@@ -11856,7 +11978,7 @@
             </a:r>
           </a:p>
           <a:p>
-            <a:pPr marL="457200" lvl="0" indent="-457200" algn="just">
+            <a:pPr marL="457200" lvl="0" indent="-457200">
               <a:buFont typeface="+mj-lt"/>
               <a:buAutoNum type="arabicPeriod"/>
             </a:pPr>
@@ -11865,25 +11987,10 @@
                 <a:latin typeface="Times New Roman" panose="02020603050405020304" pitchFamily="18" charset="0"/>
                 <a:cs typeface="Times New Roman" panose="02020603050405020304" pitchFamily="18" charset="0"/>
               </a:rPr>
-              <a:t>È chiaro sin da subito come passare dalla Home alla schermata degli obiettivi (“</a:t>
-            </a:r>
-            <a:r>
-              <a:rPr lang="it-IT" sz="2000" dirty="0" err="1" smtClean="0">
-                <a:latin typeface="Times New Roman" panose="02020603050405020304" pitchFamily="18" charset="0"/>
-                <a:cs typeface="Times New Roman" panose="02020603050405020304" pitchFamily="18" charset="0"/>
-              </a:rPr>
-              <a:t>Goals</a:t>
-            </a:r>
-            <a:r>
-              <a:rPr lang="it-IT" sz="2000" dirty="0" smtClean="0">
-                <a:latin typeface="Times New Roman" panose="02020603050405020304" pitchFamily="18" charset="0"/>
-                <a:cs typeface="Times New Roman" panose="02020603050405020304" pitchFamily="18" charset="0"/>
-              </a:rPr>
-              <a:t>”).</a:t>
-            </a:r>
-          </a:p>
-          <a:p>
-            <a:pPr algn="just"/>
+              <a:t>Intuitività della schermata.</a:t>
+            </a:r>
+          </a:p>
+          <a:p>
             <a:r>
               <a:rPr lang="it-IT" sz="2000" dirty="0" smtClean="0">
                 <a:latin typeface="Times New Roman" panose="02020603050405020304" pitchFamily="18" charset="0"/>
@@ -11893,7 +12000,7 @@
             </a:r>
           </a:p>
           <a:p>
-            <a:pPr marL="457200" lvl="0" indent="-457200" algn="just">
+            <a:pPr marL="457200" lvl="0" indent="-457200">
               <a:buFont typeface="+mj-lt"/>
               <a:buAutoNum type="arabicPeriod" startAt="2"/>
             </a:pPr>
@@ -11902,11 +12009,10 @@
                 <a:latin typeface="Times New Roman" panose="02020603050405020304" pitchFamily="18" charset="0"/>
                 <a:cs typeface="Times New Roman" panose="02020603050405020304" pitchFamily="18" charset="0"/>
               </a:rPr>
-              <a:t>Intuitività nella scelta dell’obiettivo.</a:t>
-            </a:r>
-          </a:p>
-          <a:p>
-            <a:pPr algn="just"/>
+              <a:t>Si capisce sempre quali operazioni effettuare di volta in volta.</a:t>
+            </a:r>
+          </a:p>
+          <a:p>
             <a:r>
               <a:rPr lang="it-IT" sz="2000" dirty="0" smtClean="0">
                 <a:latin typeface="Times New Roman" panose="02020603050405020304" pitchFamily="18" charset="0"/>
@@ -11916,7 +12022,7 @@
             </a:r>
           </a:p>
           <a:p>
-            <a:pPr marL="457200" lvl="0" indent="-457200" algn="just">
+            <a:pPr marL="457200" lvl="0" indent="-457200">
               <a:buFont typeface="+mj-lt"/>
               <a:buAutoNum type="arabicPeriod" startAt="3"/>
             </a:pPr>
@@ -11925,11 +12031,10 @@
                 <a:latin typeface="Times New Roman" panose="02020603050405020304" pitchFamily="18" charset="0"/>
                 <a:cs typeface="Times New Roman" panose="02020603050405020304" pitchFamily="18" charset="0"/>
               </a:rPr>
-              <a:t>È sempre possibile conoscere lo stato del sistema.</a:t>
-            </a:r>
-          </a:p>
-          <a:p>
-            <a:pPr algn="just"/>
+              <a:t>Si riesce a capire come passare da una schermata all’altra.</a:t>
+            </a:r>
+          </a:p>
+          <a:p>
             <a:r>
               <a:rPr lang="it-IT" sz="2000" dirty="0" smtClean="0">
                 <a:latin typeface="Times New Roman" panose="02020603050405020304" pitchFamily="18" charset="0"/>
@@ -11939,7 +12044,7 @@
             </a:r>
           </a:p>
           <a:p>
-            <a:pPr marL="457200" lvl="0" indent="-457200" algn="just">
+            <a:pPr marL="457200" lvl="0" indent="-457200">
               <a:buFont typeface="+mj-lt"/>
               <a:buAutoNum type="arabicPeriod" startAt="4"/>
             </a:pPr>
@@ -11952,53 +12057,6 @@
             </a:r>
           </a:p>
           <a:p>
-            <a:pPr algn="just"/>
-            <a:r>
-              <a:rPr lang="it-IT" sz="2000" dirty="0" smtClean="0">
-                <a:latin typeface="Times New Roman" panose="02020603050405020304" pitchFamily="18" charset="0"/>
-                <a:cs typeface="Times New Roman" panose="02020603050405020304" pitchFamily="18" charset="0"/>
-              </a:rPr>
-              <a:t>			1    2    3    4    5</a:t>
-            </a:r>
-          </a:p>
-          <a:p>
-            <a:pPr marL="457200" lvl="0" indent="-457200" algn="just">
-              <a:buFont typeface="+mj-lt"/>
-              <a:buAutoNum type="arabicPeriod" startAt="5"/>
-            </a:pPr>
-            <a:r>
-              <a:rPr lang="it-IT" sz="2000" dirty="0" smtClean="0">
-                <a:latin typeface="Times New Roman" panose="02020603050405020304" pitchFamily="18" charset="0"/>
-                <a:cs typeface="Times New Roman" panose="02020603050405020304" pitchFamily="18" charset="0"/>
-              </a:rPr>
-              <a:t>È intuitivo tornare alla pagina principale.</a:t>
-            </a:r>
-          </a:p>
-          <a:p>
-            <a:pPr algn="just"/>
-            <a:r>
-              <a:rPr lang="it-IT" sz="2000" dirty="0" smtClean="0">
-                <a:latin typeface="Times New Roman" panose="02020603050405020304" pitchFamily="18" charset="0"/>
-                <a:cs typeface="Times New Roman" panose="02020603050405020304" pitchFamily="18" charset="0"/>
-              </a:rPr>
-              <a:t>			1    2    3    4    5</a:t>
-            </a:r>
-          </a:p>
-          <a:p>
-            <a:pPr marL="457200" lvl="0" indent="-457200" algn="just">
-              <a:buFont typeface="+mj-lt"/>
-              <a:buAutoNum type="arabicPeriod" startAt="6"/>
-            </a:pPr>
-            <a:r>
-              <a:rPr lang="it-IT" sz="2000" dirty="0" smtClean="0">
-                <a:latin typeface="Times New Roman" panose="02020603050405020304" pitchFamily="18" charset="0"/>
-                <a:cs typeface="Times New Roman" panose="02020603050405020304" pitchFamily="18" charset="0"/>
-              </a:rPr>
-              <a:t>È noto che l’obiettivo scelto è visualizzato nella Home.</a:t>
-            </a:r>
-          </a:p>
-          <a:p>
-            <a:pPr algn="just"/>
             <a:r>
               <a:rPr lang="it-IT" sz="2000" dirty="0" smtClean="0">
                 <a:latin typeface="Times New Roman" panose="02020603050405020304" pitchFamily="18" charset="0"/>
@@ -12147,46 +12205,8 @@
                 <a:latin typeface="Times New Roman" panose="02020603050405020304" pitchFamily="18" charset="0"/>
                 <a:cs typeface="Times New Roman" panose="02020603050405020304" pitchFamily="18" charset="0"/>
               </a:rPr>
-              <a:t>Task 3 – Vincere il premio “</a:t>
-            </a:r>
-            <a:r>
-              <a:rPr lang="it-IT" sz="2500" b="1" dirty="0" err="1" smtClean="0">
-                <a:latin typeface="Times New Roman" panose="02020603050405020304" pitchFamily="18" charset="0"/>
-                <a:cs typeface="Times New Roman" panose="02020603050405020304" pitchFamily="18" charset="0"/>
-              </a:rPr>
-              <a:t>Defeat</a:t>
-            </a:r>
-            <a:r>
-              <a:rPr lang="it-IT" sz="2500" b="1" dirty="0" smtClean="0">
-                <a:latin typeface="Times New Roman" panose="02020603050405020304" pitchFamily="18" charset="0"/>
-                <a:cs typeface="Times New Roman" panose="02020603050405020304" pitchFamily="18" charset="0"/>
-              </a:rPr>
-              <a:t> the </a:t>
-            </a:r>
-            <a:r>
-              <a:rPr lang="it-IT" sz="2500" b="1" dirty="0" err="1" smtClean="0">
-                <a:latin typeface="Times New Roman" panose="02020603050405020304" pitchFamily="18" charset="0"/>
-                <a:cs typeface="Times New Roman" panose="02020603050405020304" pitchFamily="18" charset="0"/>
-              </a:rPr>
-              <a:t>temptation</a:t>
-            </a:r>
-            <a:r>
-              <a:rPr lang="it-IT" sz="2500" b="1" dirty="0" smtClean="0">
-                <a:latin typeface="Times New Roman" panose="02020603050405020304" pitchFamily="18" charset="0"/>
-                <a:cs typeface="Times New Roman" panose="02020603050405020304" pitchFamily="18" charset="0"/>
-              </a:rPr>
-              <a:t>”</a:t>
-            </a:r>
-          </a:p>
-          <a:p>
-            <a:pPr lvl="0" algn="ctr">
-              <a:lnSpc>
-                <a:spcPct val="120000"/>
-              </a:lnSpc>
-              <a:spcBef>
-                <a:spcPts val="1000"/>
-              </a:spcBef>
-            </a:pPr>
+              <a:t>Task 2 – Selezionare un obiettivo</a:t>
+            </a:r>
             <a:endParaRPr lang="it-IT" sz="2500" dirty="0" smtClean="0">
               <a:latin typeface="Times New Roman" panose="02020603050405020304" pitchFamily="18" charset="0"/>
               <a:cs typeface="Times New Roman" panose="02020603050405020304" pitchFamily="18" charset="0"/>
@@ -12200,163 +12220,163 @@
             </a:endParaRPr>
           </a:p>
           <a:p>
-            <a:pPr lvl="0"/>
-            <a:r>
-              <a:rPr lang="it-IT" sz="2000" dirty="0" smtClean="0">
-                <a:latin typeface="Times New Roman" panose="02020603050405020304" pitchFamily="18" charset="0"/>
-                <a:cs typeface="Times New Roman" panose="02020603050405020304" pitchFamily="18" charset="0"/>
-              </a:rPr>
-              <a:t>1.   La </a:t>
-            </a:r>
-            <a:r>
-              <a:rPr lang="it-IT" sz="2000" dirty="0">
-                <a:latin typeface="Times New Roman" panose="02020603050405020304" pitchFamily="18" charset="0"/>
-                <a:cs typeface="Times New Roman" panose="02020603050405020304" pitchFamily="18" charset="0"/>
-              </a:rPr>
-              <a:t>modalità con la quale si può vincere il </a:t>
-            </a:r>
-            <a:r>
-              <a:rPr lang="it-IT" sz="2000" dirty="0" smtClean="0">
-                <a:latin typeface="Times New Roman" panose="02020603050405020304" pitchFamily="18" charset="0"/>
-                <a:cs typeface="Times New Roman" panose="02020603050405020304" pitchFamily="18" charset="0"/>
-              </a:rPr>
-              <a:t>premio è ben spiegata.</a:t>
-            </a:r>
-          </a:p>
-          <a:p>
-            <a:pPr algn="ctr"/>
-            <a:r>
-              <a:rPr lang="it-IT" sz="2000" dirty="0" smtClean="0">
-                <a:latin typeface="Times New Roman" panose="02020603050405020304" pitchFamily="18" charset="0"/>
-                <a:cs typeface="Times New Roman" panose="02020603050405020304" pitchFamily="18" charset="0"/>
-              </a:rPr>
-              <a:t>1    2    3    4    5</a:t>
-            </a:r>
-          </a:p>
-          <a:p>
-            <a:pPr lvl="0"/>
-            <a:r>
-              <a:rPr lang="it-IT" sz="2000" dirty="0" smtClean="0">
-                <a:latin typeface="Times New Roman" panose="02020603050405020304" pitchFamily="18" charset="0"/>
-                <a:cs typeface="Times New Roman" panose="02020603050405020304" pitchFamily="18" charset="0"/>
-              </a:rPr>
-              <a:t>2.   L’interfaccia </a:t>
-            </a:r>
-            <a:r>
-              <a:rPr lang="it-IT" sz="2000" dirty="0">
-                <a:latin typeface="Times New Roman" panose="02020603050405020304" pitchFamily="18" charset="0"/>
-                <a:cs typeface="Times New Roman" panose="02020603050405020304" pitchFamily="18" charset="0"/>
-              </a:rPr>
-              <a:t>è intuitiva.</a:t>
-            </a:r>
-          </a:p>
-          <a:p>
-            <a:pPr algn="ctr"/>
-            <a:r>
-              <a:rPr lang="it-IT" sz="2000" dirty="0">
-                <a:latin typeface="Times New Roman" panose="02020603050405020304" pitchFamily="18" charset="0"/>
-                <a:cs typeface="Times New Roman" panose="02020603050405020304" pitchFamily="18" charset="0"/>
-              </a:rPr>
-              <a:t>1    2    3    4    5</a:t>
-            </a:r>
-          </a:p>
-          <a:p>
-            <a:pPr lvl="0"/>
-            <a:r>
-              <a:rPr lang="it-IT" sz="2000" dirty="0" smtClean="0">
-                <a:latin typeface="Times New Roman" panose="02020603050405020304" pitchFamily="18" charset="0"/>
-                <a:cs typeface="Times New Roman" panose="02020603050405020304" pitchFamily="18" charset="0"/>
-              </a:rPr>
-              <a:t>3.   I </a:t>
-            </a:r>
-            <a:r>
-              <a:rPr lang="it-IT" sz="2000" dirty="0">
-                <a:latin typeface="Times New Roman" panose="02020603050405020304" pitchFamily="18" charset="0"/>
-                <a:cs typeface="Times New Roman" panose="02020603050405020304" pitchFamily="18" charset="0"/>
-              </a:rPr>
-              <a:t>collegamenti fra le schermate sono coerenti.</a:t>
-            </a:r>
-          </a:p>
-          <a:p>
-            <a:pPr algn="ctr"/>
-            <a:r>
-              <a:rPr lang="it-IT" sz="2000" dirty="0">
-                <a:latin typeface="Times New Roman" panose="02020603050405020304" pitchFamily="18" charset="0"/>
-                <a:cs typeface="Times New Roman" panose="02020603050405020304" pitchFamily="18" charset="0"/>
-              </a:rPr>
-              <a:t>1    2    3    4    5</a:t>
-            </a:r>
-          </a:p>
-          <a:p>
-            <a:pPr lvl="0"/>
-            <a:r>
-              <a:rPr lang="it-IT" sz="2000" dirty="0" smtClean="0">
-                <a:latin typeface="Times New Roman" panose="02020603050405020304" pitchFamily="18" charset="0"/>
-                <a:cs typeface="Times New Roman" panose="02020603050405020304" pitchFamily="18" charset="0"/>
-              </a:rPr>
-              <a:t>4.   È </a:t>
-            </a:r>
-            <a:r>
-              <a:rPr lang="it-IT" sz="2000" dirty="0">
-                <a:latin typeface="Times New Roman" panose="02020603050405020304" pitchFamily="18" charset="0"/>
-                <a:cs typeface="Times New Roman" panose="02020603050405020304" pitchFamily="18" charset="0"/>
-              </a:rPr>
-              <a:t>possibile gestire gli errori.</a:t>
-            </a:r>
-          </a:p>
-          <a:p>
-            <a:pPr algn="ctr"/>
-            <a:r>
-              <a:rPr lang="it-IT" sz="2000" dirty="0">
-                <a:latin typeface="Times New Roman" panose="02020603050405020304" pitchFamily="18" charset="0"/>
-                <a:cs typeface="Times New Roman" panose="02020603050405020304" pitchFamily="18" charset="0"/>
-              </a:rPr>
-              <a:t>1    2    3    4    5</a:t>
-            </a:r>
-          </a:p>
-          <a:p>
-            <a:pPr lvl="0"/>
-            <a:r>
-              <a:rPr lang="it-IT" sz="2000" dirty="0" smtClean="0">
-                <a:latin typeface="Times New Roman" panose="02020603050405020304" pitchFamily="18" charset="0"/>
-                <a:cs typeface="Times New Roman" panose="02020603050405020304" pitchFamily="18" charset="0"/>
-              </a:rPr>
-              <a:t>5.   È </a:t>
-            </a:r>
-            <a:r>
-              <a:rPr lang="it-IT" sz="2000" dirty="0">
-                <a:latin typeface="Times New Roman" panose="02020603050405020304" pitchFamily="18" charset="0"/>
-                <a:cs typeface="Times New Roman" panose="02020603050405020304" pitchFamily="18" charset="0"/>
-              </a:rPr>
-              <a:t>possibile individuare facilmente quali premi sono stati vinti e quali </a:t>
-            </a:r>
-            <a:r>
-              <a:rPr lang="it-IT" sz="2000" dirty="0" smtClean="0">
-                <a:latin typeface="Times New Roman" panose="02020603050405020304" pitchFamily="18" charset="0"/>
-                <a:cs typeface="Times New Roman" panose="02020603050405020304" pitchFamily="18" charset="0"/>
-              </a:rPr>
-              <a:t>    no</a:t>
-            </a:r>
-            <a:r>
-              <a:rPr lang="it-IT" sz="2000" dirty="0">
-                <a:latin typeface="Times New Roman" panose="02020603050405020304" pitchFamily="18" charset="0"/>
-                <a:cs typeface="Times New Roman" panose="02020603050405020304" pitchFamily="18" charset="0"/>
-              </a:rPr>
-              <a:t>.</a:t>
-            </a:r>
-          </a:p>
-          <a:p>
-            <a:pPr algn="ctr"/>
-            <a:r>
-              <a:rPr lang="it-IT" sz="2000" dirty="0">
-                <a:latin typeface="Times New Roman" panose="02020603050405020304" pitchFamily="18" charset="0"/>
-                <a:cs typeface="Times New Roman" panose="02020603050405020304" pitchFamily="18" charset="0"/>
-              </a:rPr>
-              <a:t>1    2    3    4    5</a:t>
-            </a:r>
-          </a:p>
-          <a:p>
-            <a:endParaRPr lang="it-IT" sz="2000" dirty="0" smtClean="0">
+            <a:r>
+              <a:rPr lang="it-IT" sz="2600" dirty="0" smtClean="0"/>
+              <a:t> </a:t>
+            </a:r>
+          </a:p>
+          <a:p>
+            <a:pPr marL="457200" lvl="0" indent="-457200" algn="just">
+              <a:buFont typeface="+mj-lt"/>
+              <a:buAutoNum type="arabicPeriod"/>
+            </a:pPr>
+            <a:r>
+              <a:rPr lang="it-IT" sz="2000" dirty="0" smtClean="0">
+                <a:latin typeface="Times New Roman" panose="02020603050405020304" pitchFamily="18" charset="0"/>
+                <a:cs typeface="Times New Roman" panose="02020603050405020304" pitchFamily="18" charset="0"/>
+              </a:rPr>
+              <a:t>È chiaro sin da subito come passare dalla Home alla schermata degli obiettivi (“</a:t>
+            </a:r>
+            <a:r>
+              <a:rPr lang="it-IT" sz="2000" dirty="0" err="1" smtClean="0">
+                <a:latin typeface="Times New Roman" panose="02020603050405020304" pitchFamily="18" charset="0"/>
+                <a:cs typeface="Times New Roman" panose="02020603050405020304" pitchFamily="18" charset="0"/>
+              </a:rPr>
+              <a:t>Goals</a:t>
+            </a:r>
+            <a:r>
+              <a:rPr lang="it-IT" sz="2000" dirty="0" smtClean="0">
+                <a:latin typeface="Times New Roman" panose="02020603050405020304" pitchFamily="18" charset="0"/>
+                <a:cs typeface="Times New Roman" panose="02020603050405020304" pitchFamily="18" charset="0"/>
+              </a:rPr>
+              <a:t>”).</a:t>
+            </a:r>
+          </a:p>
+          <a:p>
+            <a:pPr algn="just"/>
+            <a:r>
+              <a:rPr lang="it-IT" sz="2000" dirty="0" smtClean="0">
+                <a:latin typeface="Times New Roman" panose="02020603050405020304" pitchFamily="18" charset="0"/>
+                <a:cs typeface="Times New Roman" panose="02020603050405020304" pitchFamily="18" charset="0"/>
+              </a:rPr>
+              <a:t>			1    2    3    4    5</a:t>
+            </a:r>
+          </a:p>
+          <a:p>
+            <a:pPr marL="457200" lvl="0" indent="-457200" algn="just">
+              <a:buFont typeface="+mj-lt"/>
+              <a:buAutoNum type="arabicPeriod" startAt="2"/>
+            </a:pPr>
+            <a:r>
+              <a:rPr lang="it-IT" sz="2000" dirty="0" smtClean="0">
+                <a:latin typeface="Times New Roman" panose="02020603050405020304" pitchFamily="18" charset="0"/>
+                <a:cs typeface="Times New Roman" panose="02020603050405020304" pitchFamily="18" charset="0"/>
+              </a:rPr>
+              <a:t>Intuitività nella scelta dell’obiettivo.</a:t>
+            </a:r>
+          </a:p>
+          <a:p>
+            <a:pPr algn="just"/>
+            <a:r>
+              <a:rPr lang="it-IT" sz="2000" dirty="0" smtClean="0">
+                <a:latin typeface="Times New Roman" panose="02020603050405020304" pitchFamily="18" charset="0"/>
+                <a:cs typeface="Times New Roman" panose="02020603050405020304" pitchFamily="18" charset="0"/>
+              </a:rPr>
+              <a:t>			1    2    3    4    5</a:t>
+            </a:r>
+          </a:p>
+          <a:p>
+            <a:pPr marL="457200" lvl="0" indent="-457200" algn="just">
+              <a:buFont typeface="+mj-lt"/>
+              <a:buAutoNum type="arabicPeriod" startAt="3"/>
+            </a:pPr>
+            <a:r>
+              <a:rPr lang="it-IT" sz="2000" dirty="0" smtClean="0">
+                <a:latin typeface="Times New Roman" panose="02020603050405020304" pitchFamily="18" charset="0"/>
+                <a:cs typeface="Times New Roman" panose="02020603050405020304" pitchFamily="18" charset="0"/>
+              </a:rPr>
+              <a:t>È sempre possibile conoscere lo stato del sistema.</a:t>
+            </a:r>
+          </a:p>
+          <a:p>
+            <a:pPr algn="just"/>
+            <a:r>
+              <a:rPr lang="it-IT" sz="2000" dirty="0" smtClean="0">
+                <a:latin typeface="Times New Roman" panose="02020603050405020304" pitchFamily="18" charset="0"/>
+                <a:cs typeface="Times New Roman" panose="02020603050405020304" pitchFamily="18" charset="0"/>
+              </a:rPr>
+              <a:t>			1    2    3    4    5</a:t>
+            </a:r>
+          </a:p>
+          <a:p>
+            <a:pPr marL="457200" lvl="0" indent="-457200" algn="just">
+              <a:buFont typeface="+mj-lt"/>
+              <a:buAutoNum type="arabicPeriod" startAt="4"/>
+            </a:pPr>
+            <a:r>
+              <a:rPr lang="it-IT" sz="2000" dirty="0" smtClean="0">
+                <a:latin typeface="Times New Roman" panose="02020603050405020304" pitchFamily="18" charset="0"/>
+                <a:cs typeface="Times New Roman" panose="02020603050405020304" pitchFamily="18" charset="0"/>
+              </a:rPr>
+              <a:t>È sempre possibile capire e correggere gli errori commessi.</a:t>
+            </a:r>
+          </a:p>
+          <a:p>
+            <a:pPr algn="just"/>
+            <a:r>
+              <a:rPr lang="it-IT" sz="2000" dirty="0" smtClean="0">
+                <a:latin typeface="Times New Roman" panose="02020603050405020304" pitchFamily="18" charset="0"/>
+                <a:cs typeface="Times New Roman" panose="02020603050405020304" pitchFamily="18" charset="0"/>
+              </a:rPr>
+              <a:t>			1    2    3    4    5</a:t>
+            </a:r>
+          </a:p>
+          <a:p>
+            <a:pPr marL="457200" lvl="0" indent="-457200" algn="just">
+              <a:buFont typeface="+mj-lt"/>
+              <a:buAutoNum type="arabicPeriod" startAt="5"/>
+            </a:pPr>
+            <a:r>
+              <a:rPr lang="it-IT" sz="2000" dirty="0" smtClean="0">
+                <a:latin typeface="Times New Roman" panose="02020603050405020304" pitchFamily="18" charset="0"/>
+                <a:cs typeface="Times New Roman" panose="02020603050405020304" pitchFamily="18" charset="0"/>
+              </a:rPr>
+              <a:t>È intuitivo tornare alla pagina principale.</a:t>
+            </a:r>
+          </a:p>
+          <a:p>
+            <a:pPr algn="just"/>
+            <a:r>
+              <a:rPr lang="it-IT" sz="2000" dirty="0" smtClean="0">
+                <a:latin typeface="Times New Roman" panose="02020603050405020304" pitchFamily="18" charset="0"/>
+                <a:cs typeface="Times New Roman" panose="02020603050405020304" pitchFamily="18" charset="0"/>
+              </a:rPr>
+              <a:t>			1    2    3    4    5</a:t>
+            </a:r>
+          </a:p>
+          <a:p>
+            <a:pPr marL="457200" lvl="0" indent="-457200" algn="just">
+              <a:buFont typeface="+mj-lt"/>
+              <a:buAutoNum type="arabicPeriod" startAt="6"/>
+            </a:pPr>
+            <a:r>
+              <a:rPr lang="it-IT" sz="2000" dirty="0" smtClean="0">
+                <a:latin typeface="Times New Roman" panose="02020603050405020304" pitchFamily="18" charset="0"/>
+                <a:cs typeface="Times New Roman" panose="02020603050405020304" pitchFamily="18" charset="0"/>
+              </a:rPr>
+              <a:t>È noto che l’obiettivo scelto è visualizzato nella Home.</a:t>
+            </a:r>
+          </a:p>
+          <a:p>
+            <a:pPr algn="just"/>
+            <a:r>
+              <a:rPr lang="it-IT" sz="2000" dirty="0" smtClean="0">
+                <a:latin typeface="Times New Roman" panose="02020603050405020304" pitchFamily="18" charset="0"/>
+                <a:cs typeface="Times New Roman" panose="02020603050405020304" pitchFamily="18" charset="0"/>
+              </a:rPr>
+              <a:t>			1    2    3    4    5</a:t>
+            </a:r>
+            <a:endParaRPr lang="it-IT" sz="2000" dirty="0">
               <a:latin typeface="Times New Roman" panose="02020603050405020304" pitchFamily="18" charset="0"/>
               <a:cs typeface="Times New Roman" panose="02020603050405020304" pitchFamily="18" charset="0"/>
             </a:endParaRPr>
@@ -12497,50 +12517,46 @@
                 <a:latin typeface="Times New Roman" panose="02020603050405020304" pitchFamily="18" charset="0"/>
                 <a:cs typeface="Times New Roman" panose="02020603050405020304" pitchFamily="18" charset="0"/>
               </a:rPr>
-              <a:t>Task 4 – Vincere il premio “</a:t>
+              <a:t>Task 3 – Vincere il premio “</a:t>
             </a:r>
             <a:r>
               <a:rPr lang="it-IT" sz="2500" b="1" dirty="0" err="1" smtClean="0">
                 <a:latin typeface="Times New Roman" panose="02020603050405020304" pitchFamily="18" charset="0"/>
                 <a:cs typeface="Times New Roman" panose="02020603050405020304" pitchFamily="18" charset="0"/>
               </a:rPr>
-              <a:t>Only</a:t>
+              <a:t>Defeat</a:t>
             </a:r>
             <a:r>
               <a:rPr lang="it-IT" sz="2500" b="1" dirty="0" smtClean="0">
                 <a:latin typeface="Times New Roman" panose="02020603050405020304" pitchFamily="18" charset="0"/>
                 <a:cs typeface="Times New Roman" panose="02020603050405020304" pitchFamily="18" charset="0"/>
               </a:rPr>
-              <a:t> 10 </a:t>
+              <a:t> the </a:t>
             </a:r>
             <a:r>
               <a:rPr lang="it-IT" sz="2500" b="1" dirty="0" err="1" smtClean="0">
                 <a:latin typeface="Times New Roman" panose="02020603050405020304" pitchFamily="18" charset="0"/>
                 <a:cs typeface="Times New Roman" panose="02020603050405020304" pitchFamily="18" charset="0"/>
               </a:rPr>
-              <a:t>cigarettes</a:t>
+              <a:t>temptation</a:t>
             </a:r>
             <a:r>
               <a:rPr lang="it-IT" sz="2500" b="1" dirty="0" smtClean="0">
                 <a:latin typeface="Times New Roman" panose="02020603050405020304" pitchFamily="18" charset="0"/>
                 <a:cs typeface="Times New Roman" panose="02020603050405020304" pitchFamily="18" charset="0"/>
               </a:rPr>
-              <a:t> </a:t>
-            </a:r>
-            <a:r>
-              <a:rPr lang="it-IT" sz="2500" b="1" dirty="0" err="1" smtClean="0">
-                <a:latin typeface="Times New Roman" panose="02020603050405020304" pitchFamily="18" charset="0"/>
-                <a:cs typeface="Times New Roman" panose="02020603050405020304" pitchFamily="18" charset="0"/>
-              </a:rPr>
-              <a:t>smoked</a:t>
-            </a:r>
-            <a:r>
-              <a:rPr lang="it-IT" sz="2500" b="1" dirty="0" smtClean="0">
-                <a:latin typeface="Times New Roman" panose="02020603050405020304" pitchFamily="18" charset="0"/>
-                <a:cs typeface="Times New Roman" panose="02020603050405020304" pitchFamily="18" charset="0"/>
-              </a:rPr>
               <a:t>”</a:t>
             </a:r>
+          </a:p>
+          <a:p>
+            <a:pPr lvl="0" algn="ctr">
+              <a:lnSpc>
+                <a:spcPct val="120000"/>
+              </a:lnSpc>
+              <a:spcBef>
+                <a:spcPts val="1000"/>
+              </a:spcBef>
+            </a:pPr>
             <a:endParaRPr lang="it-IT" sz="2500" dirty="0" smtClean="0">
               <a:latin typeface="Times New Roman" panose="02020603050405020304" pitchFamily="18" charset="0"/>
               <a:cs typeface="Times New Roman" panose="02020603050405020304" pitchFamily="18" charset="0"/>
@@ -12554,7 +12570,7 @@
             </a:endParaRPr>
           </a:p>
           <a:p>
-            <a:pPr lvl="0" algn="just"/>
+            <a:pPr lvl="0"/>
             <a:r>
               <a:rPr lang="it-IT" sz="2000" dirty="0" smtClean="0">
                 <a:latin typeface="Times New Roman" panose="02020603050405020304" pitchFamily="18" charset="0"/>
@@ -12567,35 +12583,68 @@
                 <a:latin typeface="Times New Roman" panose="02020603050405020304" pitchFamily="18" charset="0"/>
                 <a:cs typeface="Times New Roman" panose="02020603050405020304" pitchFamily="18" charset="0"/>
               </a:rPr>
-              <a:t>funzionalità del pulsante “</a:t>
-            </a:r>
-            <a:r>
-              <a:rPr lang="it-IT" sz="2000" dirty="0" err="1">
-                <a:latin typeface="Times New Roman" panose="02020603050405020304" pitchFamily="18" charset="0"/>
-                <a:cs typeface="Times New Roman" panose="02020603050405020304" pitchFamily="18" charset="0"/>
-              </a:rPr>
-              <a:t>Add</a:t>
+              <a:t>modalità con la quale si può vincere il </a:t>
+            </a:r>
+            <a:r>
+              <a:rPr lang="it-IT" sz="2000" dirty="0" smtClean="0">
+                <a:latin typeface="Times New Roman" panose="02020603050405020304" pitchFamily="18" charset="0"/>
+                <a:cs typeface="Times New Roman" panose="02020603050405020304" pitchFamily="18" charset="0"/>
+              </a:rPr>
+              <a:t>premio è ben spiegata.</a:t>
+            </a:r>
+          </a:p>
+          <a:p>
+            <a:pPr algn="ctr"/>
+            <a:r>
+              <a:rPr lang="it-IT" sz="2000" dirty="0" smtClean="0">
+                <a:latin typeface="Times New Roman" panose="02020603050405020304" pitchFamily="18" charset="0"/>
+                <a:cs typeface="Times New Roman" panose="02020603050405020304" pitchFamily="18" charset="0"/>
+              </a:rPr>
+              <a:t>1    2    3    4    5</a:t>
+            </a:r>
+          </a:p>
+          <a:p>
+            <a:pPr lvl="0"/>
+            <a:r>
+              <a:rPr lang="it-IT" sz="2000" dirty="0" smtClean="0">
+                <a:latin typeface="Times New Roman" panose="02020603050405020304" pitchFamily="18" charset="0"/>
+                <a:cs typeface="Times New Roman" panose="02020603050405020304" pitchFamily="18" charset="0"/>
+              </a:rPr>
+              <a:t>2.   L’interfaccia </a:t>
             </a:r>
             <a:r>
               <a:rPr lang="it-IT" sz="2000" dirty="0">
                 <a:latin typeface="Times New Roman" panose="02020603050405020304" pitchFamily="18" charset="0"/>
                 <a:cs typeface="Times New Roman" panose="02020603050405020304" pitchFamily="18" charset="0"/>
               </a:rPr>
-              <a:t> a </a:t>
-            </a:r>
-            <a:r>
-              <a:rPr lang="it-IT" sz="2000" dirty="0" err="1">
-                <a:latin typeface="Times New Roman" panose="02020603050405020304" pitchFamily="18" charset="0"/>
-                <a:cs typeface="Times New Roman" panose="02020603050405020304" pitchFamily="18" charset="0"/>
-              </a:rPr>
-              <a:t>cigarette</a:t>
-            </a:r>
+              <a:t>è intuitiva.</a:t>
+            </a:r>
+          </a:p>
+          <a:p>
+            <a:pPr algn="ctr"/>
             <a:r>
               <a:rPr lang="it-IT" sz="2000" dirty="0">
                 <a:latin typeface="Times New Roman" panose="02020603050405020304" pitchFamily="18" charset="0"/>
                 <a:cs typeface="Times New Roman" panose="02020603050405020304" pitchFamily="18" charset="0"/>
               </a:rPr>
-              <a:t>” è comprensibile.</a:t>
+              <a:t>1    2    3    4    5</a:t>
+            </a:r>
+          </a:p>
+          <a:p>
+            <a:pPr lvl="0"/>
+            <a:r>
+              <a:rPr lang="it-IT" sz="2000" dirty="0" smtClean="0">
+                <a:latin typeface="Times New Roman" panose="02020603050405020304" pitchFamily="18" charset="0"/>
+                <a:cs typeface="Times New Roman" panose="02020603050405020304" pitchFamily="18" charset="0"/>
+              </a:rPr>
+              <a:t>3.   I </a:t>
+            </a:r>
+            <a:r>
+              <a:rPr lang="it-IT" sz="2000" dirty="0">
+                <a:latin typeface="Times New Roman" panose="02020603050405020304" pitchFamily="18" charset="0"/>
+                <a:cs typeface="Times New Roman" panose="02020603050405020304" pitchFamily="18" charset="0"/>
+              </a:rPr>
+              <a:t>collegamenti fra le schermate sono coerenti.</a:t>
             </a:r>
           </a:p>
           <a:p>
@@ -12609,20 +12658,20 @@
             </a:r>
           </a:p>
           <a:p>
-            <a:pPr lvl="0" algn="just"/>
-            <a:r>
-              <a:rPr lang="it-IT" sz="2000" dirty="0" smtClean="0">
-                <a:latin typeface="Times New Roman" panose="02020603050405020304" pitchFamily="18" charset="0"/>
-                <a:cs typeface="Times New Roman" panose="02020603050405020304" pitchFamily="18" charset="0"/>
-              </a:rPr>
-              <a:t>2.   La </a:t>
+            <a:pPr lvl="0"/>
+            <a:r>
+              <a:rPr lang="it-IT" sz="2000" dirty="0" smtClean="0">
+                <a:latin typeface="Times New Roman" panose="02020603050405020304" pitchFamily="18" charset="0"/>
+                <a:cs typeface="Times New Roman" panose="02020603050405020304" pitchFamily="18" charset="0"/>
+              </a:rPr>
+              <a:t>4.   È </a:t>
             </a:r>
             <a:r>
               <a:rPr lang="it-IT" sz="2000" dirty="0">
                 <a:latin typeface="Times New Roman" panose="02020603050405020304" pitchFamily="18" charset="0"/>
                 <a:cs typeface="Times New Roman" panose="02020603050405020304" pitchFamily="18" charset="0"/>
               </a:rPr>
-              <a:t>modalità con la quale si può vincere il premio è ben spiegata.</a:t>
+              <a:t>possibile gestire gli errori.</a:t>
             </a:r>
           </a:p>
           <a:p>
@@ -12636,143 +12685,65 @@
             </a:r>
           </a:p>
           <a:p>
-            <a:pPr lvl="0" algn="just"/>
-            <a:r>
-              <a:rPr lang="it-IT" sz="2000" dirty="0" smtClean="0">
-                <a:latin typeface="Times New Roman" panose="02020603050405020304" pitchFamily="18" charset="0"/>
-                <a:cs typeface="Times New Roman" panose="02020603050405020304" pitchFamily="18" charset="0"/>
-              </a:rPr>
-              <a:t>3.   È </a:t>
+            <a:pPr lvl="0"/>
+            <a:r>
+              <a:rPr lang="it-IT" sz="2000" dirty="0" smtClean="0">
+                <a:latin typeface="Times New Roman" panose="02020603050405020304" pitchFamily="18" charset="0"/>
+                <a:cs typeface="Times New Roman" panose="02020603050405020304" pitchFamily="18" charset="0"/>
+              </a:rPr>
+              <a:t>5.   </a:t>
+            </a:r>
+            <a:r>
+              <a:rPr lang="it-IT" sz="2000" dirty="0" smtClean="0">
+                <a:latin typeface="Times New Roman" panose="02020603050405020304" pitchFamily="18" charset="0"/>
+                <a:cs typeface="Times New Roman" panose="02020603050405020304" pitchFamily="18" charset="0"/>
+              </a:rPr>
+              <a:t>È </a:t>
             </a:r>
             <a:r>
               <a:rPr lang="it-IT" sz="2000" dirty="0">
                 <a:latin typeface="Times New Roman" panose="02020603050405020304" pitchFamily="18" charset="0"/>
                 <a:cs typeface="Times New Roman" panose="02020603050405020304" pitchFamily="18" charset="0"/>
               </a:rPr>
-              <a:t>evidente il risultato del pulsante “</a:t>
-            </a:r>
-            <a:r>
-              <a:rPr lang="it-IT" sz="2000" dirty="0" err="1">
-                <a:latin typeface="Times New Roman" panose="02020603050405020304" pitchFamily="18" charset="0"/>
-                <a:cs typeface="Times New Roman" panose="02020603050405020304" pitchFamily="18" charset="0"/>
-              </a:rPr>
-              <a:t>Add</a:t>
+              <a:t>possibile individuare facilmente quali premi sono stati vinti e quali </a:t>
+            </a:r>
+            <a:r>
+              <a:rPr lang="it-IT" sz="2000" dirty="0" smtClean="0">
+                <a:latin typeface="Times New Roman" panose="02020603050405020304" pitchFamily="18" charset="0"/>
+                <a:cs typeface="Times New Roman" panose="02020603050405020304" pitchFamily="18" charset="0"/>
+              </a:rPr>
+              <a:t>    </a:t>
+            </a:r>
+            <a:r>
+              <a:rPr lang="it-IT" sz="2000" dirty="0" smtClean="0">
+                <a:latin typeface="Times New Roman" panose="02020603050405020304" pitchFamily="18" charset="0"/>
+                <a:cs typeface="Times New Roman" panose="02020603050405020304" pitchFamily="18" charset="0"/>
+              </a:rPr>
+              <a:t>    no</a:t>
             </a:r>
             <a:r>
               <a:rPr lang="it-IT" sz="2000" dirty="0">
                 <a:latin typeface="Times New Roman" panose="02020603050405020304" pitchFamily="18" charset="0"/>
                 <a:cs typeface="Times New Roman" panose="02020603050405020304" pitchFamily="18" charset="0"/>
               </a:rPr>
-              <a:t> a </a:t>
-            </a:r>
-            <a:r>
-              <a:rPr lang="it-IT" sz="2000" dirty="0" err="1">
-                <a:latin typeface="Times New Roman" panose="02020603050405020304" pitchFamily="18" charset="0"/>
-                <a:cs typeface="Times New Roman" panose="02020603050405020304" pitchFamily="18" charset="0"/>
-              </a:rPr>
-              <a:t>cigarette</a:t>
-            </a:r>
+              <a:t>.</a:t>
+            </a:r>
+          </a:p>
+          <a:p>
+            <a:pPr algn="ctr"/>
             <a:r>
               <a:rPr lang="it-IT" sz="2000" dirty="0">
                 <a:latin typeface="Times New Roman" panose="02020603050405020304" pitchFamily="18" charset="0"/>
                 <a:cs typeface="Times New Roman" panose="02020603050405020304" pitchFamily="18" charset="0"/>
               </a:rPr>
-              <a:t>” sulla Home page.</a:t>
-            </a:r>
-          </a:p>
-          <a:p>
-            <a:pPr algn="ctr"/>
-            <a:r>
-              <a:rPr lang="it-IT" sz="2000" dirty="0">
-                <a:latin typeface="Times New Roman" panose="02020603050405020304" pitchFamily="18" charset="0"/>
-                <a:cs typeface="Times New Roman" panose="02020603050405020304" pitchFamily="18" charset="0"/>
-              </a:rPr>
               <a:t>1    2    3    4    5</a:t>
             </a:r>
           </a:p>
           <a:p>
-            <a:pPr lvl="0" algn="just"/>
-            <a:r>
-              <a:rPr lang="it-IT" sz="2000" dirty="0" smtClean="0">
-                <a:latin typeface="Times New Roman" panose="02020603050405020304" pitchFamily="18" charset="0"/>
-                <a:cs typeface="Times New Roman" panose="02020603050405020304" pitchFamily="18" charset="0"/>
-              </a:rPr>
-              <a:t>4.   I </a:t>
-            </a:r>
-            <a:r>
-              <a:rPr lang="it-IT" sz="2000" dirty="0">
-                <a:latin typeface="Times New Roman" panose="02020603050405020304" pitchFamily="18" charset="0"/>
-                <a:cs typeface="Times New Roman" panose="02020603050405020304" pitchFamily="18" charset="0"/>
-              </a:rPr>
-              <a:t>collegamenti fra le schermate sono coerenti.</a:t>
-            </a:r>
-          </a:p>
-          <a:p>
-            <a:pPr algn="ctr"/>
-            <a:r>
-              <a:rPr lang="it-IT" sz="2000" dirty="0">
-                <a:latin typeface="Times New Roman" panose="02020603050405020304" pitchFamily="18" charset="0"/>
-                <a:cs typeface="Times New Roman" panose="02020603050405020304" pitchFamily="18" charset="0"/>
-              </a:rPr>
-              <a:t>1    2    3    4    5</a:t>
-            </a:r>
-          </a:p>
-          <a:p>
-            <a:pPr lvl="0" algn="just"/>
-            <a:r>
-              <a:rPr lang="it-IT" sz="2000" dirty="0" smtClean="0">
-                <a:latin typeface="Times New Roman" panose="02020603050405020304" pitchFamily="18" charset="0"/>
-                <a:cs typeface="Times New Roman" panose="02020603050405020304" pitchFamily="18" charset="0"/>
-              </a:rPr>
-              <a:t>5.   È </a:t>
-            </a:r>
-            <a:r>
-              <a:rPr lang="it-IT" sz="2000" dirty="0">
-                <a:latin typeface="Times New Roman" panose="02020603050405020304" pitchFamily="18" charset="0"/>
-                <a:cs typeface="Times New Roman" panose="02020603050405020304" pitchFamily="18" charset="0"/>
-              </a:rPr>
-              <a:t>possibile gestire gli errori.</a:t>
-            </a:r>
-          </a:p>
-          <a:p>
-            <a:pPr algn="ctr"/>
-            <a:r>
-              <a:rPr lang="it-IT" sz="2000" dirty="0">
-                <a:latin typeface="Times New Roman" panose="02020603050405020304" pitchFamily="18" charset="0"/>
-                <a:cs typeface="Times New Roman" panose="02020603050405020304" pitchFamily="18" charset="0"/>
-              </a:rPr>
-              <a:t>1    2    3    4    5</a:t>
-            </a:r>
-          </a:p>
-          <a:p>
-            <a:pPr lvl="0"/>
-            <a:r>
-              <a:rPr lang="it-IT" sz="2000" dirty="0" smtClean="0">
-                <a:latin typeface="Times New Roman" panose="02020603050405020304" pitchFamily="18" charset="0"/>
-                <a:cs typeface="Times New Roman" panose="02020603050405020304" pitchFamily="18" charset="0"/>
-              </a:rPr>
-              <a:t>6.   È </a:t>
-            </a:r>
-            <a:r>
-              <a:rPr lang="it-IT" sz="2000" dirty="0">
-                <a:latin typeface="Times New Roman" panose="02020603050405020304" pitchFamily="18" charset="0"/>
-                <a:cs typeface="Times New Roman" panose="02020603050405020304" pitchFamily="18" charset="0"/>
-              </a:rPr>
-              <a:t>possibile individuare facilmente quali premi sono stati vinti e quali no.</a:t>
-            </a:r>
-          </a:p>
-          <a:p>
-            <a:pPr algn="ctr"/>
-            <a:r>
-              <a:rPr lang="it-IT" sz="2000" dirty="0">
-                <a:latin typeface="Times New Roman" panose="02020603050405020304" pitchFamily="18" charset="0"/>
-                <a:cs typeface="Times New Roman" panose="02020603050405020304" pitchFamily="18" charset="0"/>
-              </a:rPr>
-              <a:t>1    2    3    4    5</a:t>
-            </a:r>
-          </a:p>
-          <a:p>
-            <a:endParaRPr lang="it-IT" sz="2600" dirty="0" smtClean="0"/>
+            <a:endParaRPr lang="it-IT" sz="2000" dirty="0" smtClean="0">
+              <a:latin typeface="Times New Roman" panose="02020603050405020304" pitchFamily="18" charset="0"/>
+              <a:cs typeface="Times New Roman" panose="02020603050405020304" pitchFamily="18" charset="0"/>
+            </a:endParaRPr>
           </a:p>
         </p:txBody>
       </p:sp>
@@ -12910,18 +12881,50 @@
                 <a:latin typeface="Times New Roman" panose="02020603050405020304" pitchFamily="18" charset="0"/>
                 <a:cs typeface="Times New Roman" panose="02020603050405020304" pitchFamily="18" charset="0"/>
               </a:rPr>
-              <a:t>Task 5 – Visualizzare i progressi</a:t>
-            </a:r>
-          </a:p>
-          <a:p>
-            <a:pPr lvl="0" algn="ctr">
-              <a:lnSpc>
-                <a:spcPct val="120000"/>
-              </a:lnSpc>
-              <a:spcBef>
-                <a:spcPts val="1000"/>
-              </a:spcBef>
-            </a:pPr>
+              <a:t>Task 4 – Vincere il premio “</a:t>
+            </a:r>
+            <a:r>
+              <a:rPr lang="it-IT" sz="2500" b="1" dirty="0" err="1" smtClean="0">
+                <a:latin typeface="Times New Roman" panose="02020603050405020304" pitchFamily="18" charset="0"/>
+                <a:cs typeface="Times New Roman" panose="02020603050405020304" pitchFamily="18" charset="0"/>
+              </a:rPr>
+              <a:t>Only</a:t>
+            </a:r>
+            <a:r>
+              <a:rPr lang="it-IT" sz="2500" b="1" dirty="0" smtClean="0">
+                <a:latin typeface="Times New Roman" panose="02020603050405020304" pitchFamily="18" charset="0"/>
+                <a:cs typeface="Times New Roman" panose="02020603050405020304" pitchFamily="18" charset="0"/>
+              </a:rPr>
+              <a:t> 10 </a:t>
+            </a:r>
+            <a:r>
+              <a:rPr lang="it-IT" sz="2500" b="1" dirty="0" err="1" smtClean="0">
+                <a:latin typeface="Times New Roman" panose="02020603050405020304" pitchFamily="18" charset="0"/>
+                <a:cs typeface="Times New Roman" panose="02020603050405020304" pitchFamily="18" charset="0"/>
+              </a:rPr>
+              <a:t>cigarettes</a:t>
+            </a:r>
+            <a:r>
+              <a:rPr lang="it-IT" sz="2500" b="1" dirty="0" smtClean="0">
+                <a:latin typeface="Times New Roman" panose="02020603050405020304" pitchFamily="18" charset="0"/>
+                <a:cs typeface="Times New Roman" panose="02020603050405020304" pitchFamily="18" charset="0"/>
+              </a:rPr>
+              <a:t> </a:t>
+            </a:r>
+            <a:r>
+              <a:rPr lang="it-IT" sz="2500" b="1" dirty="0" err="1" smtClean="0">
+                <a:latin typeface="Times New Roman" panose="02020603050405020304" pitchFamily="18" charset="0"/>
+                <a:cs typeface="Times New Roman" panose="02020603050405020304" pitchFamily="18" charset="0"/>
+              </a:rPr>
+              <a:t>smoked</a:t>
+            </a:r>
+            <a:r>
+              <a:rPr lang="it-IT" sz="2500" b="1" dirty="0" smtClean="0">
+                <a:latin typeface="Times New Roman" panose="02020603050405020304" pitchFamily="18" charset="0"/>
+                <a:cs typeface="Times New Roman" panose="02020603050405020304" pitchFamily="18" charset="0"/>
+              </a:rPr>
+              <a:t>”</a:t>
+            </a:r>
             <a:endParaRPr lang="it-IT" sz="2500" dirty="0" smtClean="0">
               <a:latin typeface="Times New Roman" panose="02020603050405020304" pitchFamily="18" charset="0"/>
               <a:cs typeface="Times New Roman" panose="02020603050405020304" pitchFamily="18" charset="0"/>
@@ -12935,128 +12938,211 @@
             </a:endParaRPr>
           </a:p>
           <a:p>
+            <a:pPr lvl="0" algn="just"/>
+            <a:r>
+              <a:rPr lang="it-IT" sz="2000" dirty="0" smtClean="0">
+                <a:latin typeface="Times New Roman" panose="02020603050405020304" pitchFamily="18" charset="0"/>
+                <a:cs typeface="Times New Roman" panose="02020603050405020304" pitchFamily="18" charset="0"/>
+              </a:rPr>
+              <a:t>1.   La </a:t>
+            </a:r>
+            <a:r>
+              <a:rPr lang="it-IT" sz="2000" dirty="0">
+                <a:latin typeface="Times New Roman" panose="02020603050405020304" pitchFamily="18" charset="0"/>
+                <a:cs typeface="Times New Roman" panose="02020603050405020304" pitchFamily="18" charset="0"/>
+              </a:rPr>
+              <a:t>funzionalità del pulsante “</a:t>
+            </a:r>
+            <a:r>
+              <a:rPr lang="it-IT" sz="2000" dirty="0" err="1">
+                <a:latin typeface="Times New Roman" panose="02020603050405020304" pitchFamily="18" charset="0"/>
+                <a:cs typeface="Times New Roman" panose="02020603050405020304" pitchFamily="18" charset="0"/>
+              </a:rPr>
+              <a:t>Add</a:t>
+            </a:r>
+            <a:r>
+              <a:rPr lang="it-IT" sz="2000" dirty="0">
+                <a:latin typeface="Times New Roman" panose="02020603050405020304" pitchFamily="18" charset="0"/>
+                <a:cs typeface="Times New Roman" panose="02020603050405020304" pitchFamily="18" charset="0"/>
+              </a:rPr>
+              <a:t> a </a:t>
+            </a:r>
+            <a:r>
+              <a:rPr lang="it-IT" sz="2000" dirty="0" err="1">
+                <a:latin typeface="Times New Roman" panose="02020603050405020304" pitchFamily="18" charset="0"/>
+                <a:cs typeface="Times New Roman" panose="02020603050405020304" pitchFamily="18" charset="0"/>
+              </a:rPr>
+              <a:t>cigarette</a:t>
+            </a:r>
+            <a:r>
+              <a:rPr lang="it-IT" sz="2000" dirty="0">
+                <a:latin typeface="Times New Roman" panose="02020603050405020304" pitchFamily="18" charset="0"/>
+                <a:cs typeface="Times New Roman" panose="02020603050405020304" pitchFamily="18" charset="0"/>
+              </a:rPr>
+              <a:t>” è comprensibile.</a:t>
+            </a:r>
+          </a:p>
+          <a:p>
+            <a:pPr algn="ctr"/>
+            <a:r>
+              <a:rPr lang="it-IT" sz="2000" dirty="0">
+                <a:latin typeface="Times New Roman" panose="02020603050405020304" pitchFamily="18" charset="0"/>
+                <a:cs typeface="Times New Roman" panose="02020603050405020304" pitchFamily="18" charset="0"/>
+              </a:rPr>
+              <a:t>1    2    3    4    5</a:t>
+            </a:r>
+          </a:p>
+          <a:p>
+            <a:pPr lvl="0" algn="just"/>
+            <a:r>
+              <a:rPr lang="it-IT" sz="2000" dirty="0" smtClean="0">
+                <a:latin typeface="Times New Roman" panose="02020603050405020304" pitchFamily="18" charset="0"/>
+                <a:cs typeface="Times New Roman" panose="02020603050405020304" pitchFamily="18" charset="0"/>
+              </a:rPr>
+              <a:t>2.   La </a:t>
+            </a:r>
+            <a:r>
+              <a:rPr lang="it-IT" sz="2000" dirty="0">
+                <a:latin typeface="Times New Roman" panose="02020603050405020304" pitchFamily="18" charset="0"/>
+                <a:cs typeface="Times New Roman" panose="02020603050405020304" pitchFamily="18" charset="0"/>
+              </a:rPr>
+              <a:t>modalità con la quale si può vincere il premio è ben spiegata.</a:t>
+            </a:r>
+          </a:p>
+          <a:p>
+            <a:pPr algn="ctr"/>
+            <a:r>
+              <a:rPr lang="it-IT" sz="2000" dirty="0">
+                <a:latin typeface="Times New Roman" panose="02020603050405020304" pitchFamily="18" charset="0"/>
+                <a:cs typeface="Times New Roman" panose="02020603050405020304" pitchFamily="18" charset="0"/>
+              </a:rPr>
+              <a:t>1    2    3    4    5</a:t>
+            </a:r>
+          </a:p>
+          <a:p>
+            <a:pPr lvl="0" algn="just"/>
+            <a:r>
+              <a:rPr lang="it-IT" sz="2000" dirty="0" smtClean="0">
+                <a:latin typeface="Times New Roman" panose="02020603050405020304" pitchFamily="18" charset="0"/>
+                <a:cs typeface="Times New Roman" panose="02020603050405020304" pitchFamily="18" charset="0"/>
+              </a:rPr>
+              <a:t>3.   È </a:t>
+            </a:r>
+            <a:r>
+              <a:rPr lang="it-IT" sz="2000" dirty="0">
+                <a:latin typeface="Times New Roman" panose="02020603050405020304" pitchFamily="18" charset="0"/>
+                <a:cs typeface="Times New Roman" panose="02020603050405020304" pitchFamily="18" charset="0"/>
+              </a:rPr>
+              <a:t>evidente il risultato del pulsante “</a:t>
+            </a:r>
+            <a:r>
+              <a:rPr lang="it-IT" sz="2000" dirty="0" err="1">
+                <a:latin typeface="Times New Roman" panose="02020603050405020304" pitchFamily="18" charset="0"/>
+                <a:cs typeface="Times New Roman" panose="02020603050405020304" pitchFamily="18" charset="0"/>
+              </a:rPr>
+              <a:t>Add</a:t>
+            </a:r>
+            <a:r>
+              <a:rPr lang="it-IT" sz="2000" dirty="0">
+                <a:latin typeface="Times New Roman" panose="02020603050405020304" pitchFamily="18" charset="0"/>
+                <a:cs typeface="Times New Roman" panose="02020603050405020304" pitchFamily="18" charset="0"/>
+              </a:rPr>
+              <a:t> a </a:t>
+            </a:r>
+            <a:r>
+              <a:rPr lang="it-IT" sz="2000" dirty="0" err="1">
+                <a:latin typeface="Times New Roman" panose="02020603050405020304" pitchFamily="18" charset="0"/>
+                <a:cs typeface="Times New Roman" panose="02020603050405020304" pitchFamily="18" charset="0"/>
+              </a:rPr>
+              <a:t>cigarette</a:t>
+            </a:r>
+            <a:r>
+              <a:rPr lang="it-IT" sz="2000" dirty="0">
+                <a:latin typeface="Times New Roman" panose="02020603050405020304" pitchFamily="18" charset="0"/>
+                <a:cs typeface="Times New Roman" panose="02020603050405020304" pitchFamily="18" charset="0"/>
+              </a:rPr>
+              <a:t>” sulla Home page.</a:t>
+            </a:r>
+          </a:p>
+          <a:p>
+            <a:pPr algn="ctr"/>
+            <a:r>
+              <a:rPr lang="it-IT" sz="2000" dirty="0">
+                <a:latin typeface="Times New Roman" panose="02020603050405020304" pitchFamily="18" charset="0"/>
+                <a:cs typeface="Times New Roman" panose="02020603050405020304" pitchFamily="18" charset="0"/>
+              </a:rPr>
+              <a:t>1    2    3    4    5</a:t>
+            </a:r>
+          </a:p>
+          <a:p>
+            <a:pPr lvl="0" algn="just"/>
+            <a:r>
+              <a:rPr lang="it-IT" sz="2000" dirty="0" smtClean="0">
+                <a:latin typeface="Times New Roman" panose="02020603050405020304" pitchFamily="18" charset="0"/>
+                <a:cs typeface="Times New Roman" panose="02020603050405020304" pitchFamily="18" charset="0"/>
+              </a:rPr>
+              <a:t>4.   I </a:t>
+            </a:r>
+            <a:r>
+              <a:rPr lang="it-IT" sz="2000" dirty="0">
+                <a:latin typeface="Times New Roman" panose="02020603050405020304" pitchFamily="18" charset="0"/>
+                <a:cs typeface="Times New Roman" panose="02020603050405020304" pitchFamily="18" charset="0"/>
+              </a:rPr>
+              <a:t>collegamenti fra le schermate sono coerenti.</a:t>
+            </a:r>
+          </a:p>
+          <a:p>
+            <a:pPr algn="ctr"/>
+            <a:r>
+              <a:rPr lang="it-IT" sz="2000" dirty="0">
+                <a:latin typeface="Times New Roman" panose="02020603050405020304" pitchFamily="18" charset="0"/>
+                <a:cs typeface="Times New Roman" panose="02020603050405020304" pitchFamily="18" charset="0"/>
+              </a:rPr>
+              <a:t>1    2    3    4    5</a:t>
+            </a:r>
+          </a:p>
+          <a:p>
+            <a:pPr lvl="0" algn="just"/>
+            <a:r>
+              <a:rPr lang="it-IT" sz="2000" dirty="0" smtClean="0">
+                <a:latin typeface="Times New Roman" panose="02020603050405020304" pitchFamily="18" charset="0"/>
+                <a:cs typeface="Times New Roman" panose="02020603050405020304" pitchFamily="18" charset="0"/>
+              </a:rPr>
+              <a:t>5.   È </a:t>
+            </a:r>
+            <a:r>
+              <a:rPr lang="it-IT" sz="2000" dirty="0">
+                <a:latin typeface="Times New Roman" panose="02020603050405020304" pitchFamily="18" charset="0"/>
+                <a:cs typeface="Times New Roman" panose="02020603050405020304" pitchFamily="18" charset="0"/>
+              </a:rPr>
+              <a:t>possibile gestire gli errori.</a:t>
+            </a:r>
+          </a:p>
+          <a:p>
+            <a:pPr algn="ctr"/>
+            <a:r>
+              <a:rPr lang="it-IT" sz="2000" dirty="0">
+                <a:latin typeface="Times New Roman" panose="02020603050405020304" pitchFamily="18" charset="0"/>
+                <a:cs typeface="Times New Roman" panose="02020603050405020304" pitchFamily="18" charset="0"/>
+              </a:rPr>
+              <a:t>1    2    3    4    5</a:t>
+            </a:r>
+          </a:p>
+          <a:p>
             <a:pPr lvl="0"/>
             <a:r>
               <a:rPr lang="it-IT" sz="2000" dirty="0" smtClean="0">
                 <a:latin typeface="Times New Roman" panose="02020603050405020304" pitchFamily="18" charset="0"/>
                 <a:cs typeface="Times New Roman" panose="02020603050405020304" pitchFamily="18" charset="0"/>
               </a:rPr>
-              <a:t>1.   Il </a:t>
+              <a:t>6.   È </a:t>
             </a:r>
             <a:r>
               <a:rPr lang="it-IT" sz="2000" dirty="0">
                 <a:latin typeface="Times New Roman" panose="02020603050405020304" pitchFamily="18" charset="0"/>
                 <a:cs typeface="Times New Roman" panose="02020603050405020304" pitchFamily="18" charset="0"/>
               </a:rPr>
-              <a:t>raggiungimento della schermata “Progress” è intuitivo.</a:t>
-            </a:r>
-          </a:p>
-          <a:p>
-            <a:pPr algn="ctr"/>
-            <a:r>
-              <a:rPr lang="it-IT" sz="2000" dirty="0">
-                <a:latin typeface="Times New Roman" panose="02020603050405020304" pitchFamily="18" charset="0"/>
-                <a:cs typeface="Times New Roman" panose="02020603050405020304" pitchFamily="18" charset="0"/>
-              </a:rPr>
-              <a:t>1    2    3    4    5</a:t>
-            </a:r>
-          </a:p>
-          <a:p>
-            <a:pPr lvl="0"/>
-            <a:r>
-              <a:rPr lang="it-IT" sz="2000" dirty="0" smtClean="0">
-                <a:latin typeface="Times New Roman" panose="02020603050405020304" pitchFamily="18" charset="0"/>
-                <a:cs typeface="Times New Roman" panose="02020603050405020304" pitchFamily="18" charset="0"/>
-              </a:rPr>
-              <a:t>2.   I </a:t>
-            </a:r>
-            <a:r>
-              <a:rPr lang="it-IT" sz="2000" dirty="0">
-                <a:latin typeface="Times New Roman" panose="02020603050405020304" pitchFamily="18" charset="0"/>
-                <a:cs typeface="Times New Roman" panose="02020603050405020304" pitchFamily="18" charset="0"/>
-              </a:rPr>
-              <a:t>collegamenti tra le schermate sono coerenti.</a:t>
-            </a:r>
-          </a:p>
-          <a:p>
-            <a:pPr algn="ctr"/>
-            <a:r>
-              <a:rPr lang="it-IT" sz="2000" dirty="0">
-                <a:latin typeface="Times New Roman" panose="02020603050405020304" pitchFamily="18" charset="0"/>
-                <a:cs typeface="Times New Roman" panose="02020603050405020304" pitchFamily="18" charset="0"/>
-              </a:rPr>
-              <a:t>1    2    3    4    5</a:t>
-            </a:r>
-          </a:p>
-          <a:p>
-            <a:pPr lvl="0"/>
-            <a:r>
-              <a:rPr lang="it-IT" sz="2000" dirty="0" smtClean="0">
-                <a:latin typeface="Times New Roman" panose="02020603050405020304" pitchFamily="18" charset="0"/>
-                <a:cs typeface="Times New Roman" panose="02020603050405020304" pitchFamily="18" charset="0"/>
-              </a:rPr>
-              <a:t>3.   È </a:t>
-            </a:r>
-            <a:r>
-              <a:rPr lang="it-IT" sz="2000" dirty="0">
-                <a:latin typeface="Times New Roman" panose="02020603050405020304" pitchFamily="18" charset="0"/>
-                <a:cs typeface="Times New Roman" panose="02020603050405020304" pitchFamily="18" charset="0"/>
-              </a:rPr>
-              <a:t>possibile gestire gli errori.</a:t>
-            </a:r>
-          </a:p>
-          <a:p>
-            <a:pPr algn="ctr"/>
-            <a:r>
-              <a:rPr lang="it-IT" sz="2000" dirty="0">
-                <a:latin typeface="Times New Roman" panose="02020603050405020304" pitchFamily="18" charset="0"/>
-                <a:cs typeface="Times New Roman" panose="02020603050405020304" pitchFamily="18" charset="0"/>
-              </a:rPr>
-              <a:t>1    2    3    4    5</a:t>
-            </a:r>
-          </a:p>
-          <a:p>
-            <a:pPr lvl="0"/>
-            <a:r>
-              <a:rPr lang="it-IT" sz="2000" dirty="0" smtClean="0">
-                <a:latin typeface="Times New Roman" panose="02020603050405020304" pitchFamily="18" charset="0"/>
-                <a:cs typeface="Times New Roman" panose="02020603050405020304" pitchFamily="18" charset="0"/>
-              </a:rPr>
-              <a:t>4.   È </a:t>
-            </a:r>
-            <a:r>
-              <a:rPr lang="it-IT" sz="2000" dirty="0">
-                <a:latin typeface="Times New Roman" panose="02020603050405020304" pitchFamily="18" charset="0"/>
-                <a:cs typeface="Times New Roman" panose="02020603050405020304" pitchFamily="18" charset="0"/>
-              </a:rPr>
-              <a:t>chiaro la modalità con la quale funziona la schermata.</a:t>
-            </a:r>
-          </a:p>
-          <a:p>
-            <a:pPr algn="ctr"/>
-            <a:r>
-              <a:rPr lang="it-IT" sz="2000" dirty="0">
-                <a:latin typeface="Times New Roman" panose="02020603050405020304" pitchFamily="18" charset="0"/>
-                <a:cs typeface="Times New Roman" panose="02020603050405020304" pitchFamily="18" charset="0"/>
-              </a:rPr>
-              <a:t>1    2    3    4    5</a:t>
-            </a:r>
-          </a:p>
-          <a:p>
-            <a:pPr lvl="0"/>
-            <a:r>
-              <a:rPr lang="it-IT" sz="2000" dirty="0" smtClean="0">
-                <a:latin typeface="Times New Roman" panose="02020603050405020304" pitchFamily="18" charset="0"/>
-                <a:cs typeface="Times New Roman" panose="02020603050405020304" pitchFamily="18" charset="0"/>
-              </a:rPr>
-              <a:t>5.   È </a:t>
-            </a:r>
-            <a:r>
-              <a:rPr lang="it-IT" sz="2000" dirty="0">
-                <a:latin typeface="Times New Roman" panose="02020603050405020304" pitchFamily="18" charset="0"/>
-                <a:cs typeface="Times New Roman" panose="02020603050405020304" pitchFamily="18" charset="0"/>
-              </a:rPr>
-              <a:t>chiaro lo scopo della schermata.</a:t>
+              <a:t>possibile individuare facilmente quali premi sono stati vinti e quali no.</a:t>
             </a:r>
           </a:p>
           <a:p>
@@ -13208,50 +13294,18 @@
                 <a:latin typeface="Times New Roman" panose="02020603050405020304" pitchFamily="18" charset="0"/>
                 <a:cs typeface="Times New Roman" panose="02020603050405020304" pitchFamily="18" charset="0"/>
               </a:rPr>
-              <a:t>Task 6 – Perdere il premio “</a:t>
-            </a:r>
-            <a:r>
-              <a:rPr lang="it-IT" sz="2500" b="1" dirty="0" err="1" smtClean="0">
-                <a:latin typeface="Times New Roman" panose="02020603050405020304" pitchFamily="18" charset="0"/>
-                <a:cs typeface="Times New Roman" panose="02020603050405020304" pitchFamily="18" charset="0"/>
-              </a:rPr>
-              <a:t>Only</a:t>
-            </a:r>
-            <a:r>
-              <a:rPr lang="it-IT" sz="2500" b="1" dirty="0" smtClean="0">
-                <a:latin typeface="Times New Roman" panose="02020603050405020304" pitchFamily="18" charset="0"/>
-                <a:cs typeface="Times New Roman" panose="02020603050405020304" pitchFamily="18" charset="0"/>
-              </a:rPr>
-              <a:t> 10 </a:t>
-            </a:r>
-            <a:r>
-              <a:rPr lang="it-IT" sz="2500" b="1" dirty="0" err="1" smtClean="0">
-                <a:latin typeface="Times New Roman" panose="02020603050405020304" pitchFamily="18" charset="0"/>
-                <a:cs typeface="Times New Roman" panose="02020603050405020304" pitchFamily="18" charset="0"/>
-              </a:rPr>
-              <a:t>cigarettes</a:t>
-            </a:r>
-            <a:r>
-              <a:rPr lang="it-IT" sz="2500" b="1" dirty="0" smtClean="0">
-                <a:latin typeface="Times New Roman" panose="02020603050405020304" pitchFamily="18" charset="0"/>
-                <a:cs typeface="Times New Roman" panose="02020603050405020304" pitchFamily="18" charset="0"/>
-              </a:rPr>
-              <a:t> </a:t>
-            </a:r>
-            <a:r>
-              <a:rPr lang="it-IT" sz="2500" b="1" dirty="0" err="1" smtClean="0">
-                <a:latin typeface="Times New Roman" panose="02020603050405020304" pitchFamily="18" charset="0"/>
-                <a:cs typeface="Times New Roman" panose="02020603050405020304" pitchFamily="18" charset="0"/>
-              </a:rPr>
-              <a:t>smoked</a:t>
-            </a:r>
-            <a:r>
-              <a:rPr lang="it-IT" sz="2500" b="1" dirty="0" smtClean="0">
-                <a:latin typeface="Times New Roman" panose="02020603050405020304" pitchFamily="18" charset="0"/>
-                <a:cs typeface="Times New Roman" panose="02020603050405020304" pitchFamily="18" charset="0"/>
-              </a:rPr>
-              <a:t>”</a:t>
-            </a:r>
+              <a:t>Task 5 – Visualizzare i progressi</a:t>
+            </a:r>
+          </a:p>
+          <a:p>
+            <a:pPr lvl="0" algn="ctr">
+              <a:lnSpc>
+                <a:spcPct val="120000"/>
+              </a:lnSpc>
+              <a:spcBef>
+                <a:spcPts val="1000"/>
+              </a:spcBef>
+            </a:pPr>
             <a:endParaRPr lang="it-IT" sz="2500" dirty="0" smtClean="0">
               <a:latin typeface="Times New Roman" panose="02020603050405020304" pitchFamily="18" charset="0"/>
               <a:cs typeface="Times New Roman" panose="02020603050405020304" pitchFamily="18" charset="0"/>
@@ -13271,42 +13325,41 @@
                 <a:latin typeface="Times New Roman" panose="02020603050405020304" pitchFamily="18" charset="0"/>
                 <a:cs typeface="Times New Roman" panose="02020603050405020304" pitchFamily="18" charset="0"/>
               </a:rPr>
-              <a:t>1.   La </a:t>
+              <a:t>1.   Il </a:t>
             </a:r>
             <a:r>
               <a:rPr lang="it-IT" sz="2000" dirty="0">
                 <a:latin typeface="Times New Roman" panose="02020603050405020304" pitchFamily="18" charset="0"/>
                 <a:cs typeface="Times New Roman" panose="02020603050405020304" pitchFamily="18" charset="0"/>
               </a:rPr>
-              <a:t>funzionalità del pulsante “No more </a:t>
-            </a:r>
-            <a:r>
-              <a:rPr lang="it-IT" sz="2000" dirty="0" err="1">
-                <a:latin typeface="Times New Roman" panose="02020603050405020304" pitchFamily="18" charset="0"/>
-                <a:cs typeface="Times New Roman" panose="02020603050405020304" pitchFamily="18" charset="0"/>
-              </a:rPr>
-              <a:t>adding</a:t>
-            </a:r>
+              <a:t>raggiungimento della schermata “Progress” è intuitivo.</a:t>
+            </a:r>
+          </a:p>
+          <a:p>
+            <a:pPr algn="ctr"/>
             <a:r>
               <a:rPr lang="it-IT" sz="2000" dirty="0">
                 <a:latin typeface="Times New Roman" panose="02020603050405020304" pitchFamily="18" charset="0"/>
                 <a:cs typeface="Times New Roman" panose="02020603050405020304" pitchFamily="18" charset="0"/>
               </a:rPr>
-              <a:t> </a:t>
-            </a:r>
-            <a:r>
-              <a:rPr lang="it-IT" sz="2000" dirty="0" err="1">
-                <a:latin typeface="Times New Roman" panose="02020603050405020304" pitchFamily="18" charset="0"/>
-                <a:cs typeface="Times New Roman" panose="02020603050405020304" pitchFamily="18" charset="0"/>
-              </a:rPr>
-              <a:t>cigarette</a:t>
+              <a:t>1    2    3    4    5</a:t>
+            </a:r>
+          </a:p>
+          <a:p>
+            <a:pPr lvl="0"/>
+            <a:r>
+              <a:rPr lang="it-IT" sz="2000" dirty="0" smtClean="0">
+                <a:latin typeface="Times New Roman" panose="02020603050405020304" pitchFamily="18" charset="0"/>
+                <a:cs typeface="Times New Roman" panose="02020603050405020304" pitchFamily="18" charset="0"/>
+              </a:rPr>
+              <a:t>2.   I </a:t>
             </a:r>
             <a:r>
               <a:rPr lang="it-IT" sz="2000" dirty="0">
                 <a:latin typeface="Times New Roman" panose="02020603050405020304" pitchFamily="18" charset="0"/>
                 <a:cs typeface="Times New Roman" panose="02020603050405020304" pitchFamily="18" charset="0"/>
               </a:rPr>
-              <a:t>” è comprensibile.</a:t>
+              <a:t>collegamenti tra le schermate sono coerenti.</a:t>
             </a:r>
           </a:p>
           <a:p>
@@ -13326,14 +13379,14 @@
                 <a:latin typeface="Times New Roman" panose="02020603050405020304" pitchFamily="18" charset="0"/>
                 <a:cs typeface="Times New Roman" panose="02020603050405020304" pitchFamily="18" charset="0"/>
               </a:rPr>
-              <a:t>2.   I </a:t>
+              <a:t>3.   È </a:t>
             </a:r>
             <a:r>
               <a:rPr lang="it-IT" sz="2000" dirty="0">
                 <a:latin typeface="Times New Roman" panose="02020603050405020304" pitchFamily="18" charset="0"/>
                 <a:cs typeface="Times New Roman" panose="02020603050405020304" pitchFamily="18" charset="0"/>
               </a:rPr>
-              <a:t>collegamenti fra le schermate sono coerenti.</a:t>
+              <a:t>possibile gestire gli errori.</a:t>
             </a:r>
           </a:p>
           <a:p>
@@ -13353,14 +13406,14 @@
                 <a:latin typeface="Times New Roman" panose="02020603050405020304" pitchFamily="18" charset="0"/>
                 <a:cs typeface="Times New Roman" panose="02020603050405020304" pitchFamily="18" charset="0"/>
               </a:rPr>
-              <a:t>3.   È </a:t>
+              <a:t>4.   È </a:t>
             </a:r>
             <a:r>
               <a:rPr lang="it-IT" sz="2000" dirty="0">
                 <a:latin typeface="Times New Roman" panose="02020603050405020304" pitchFamily="18" charset="0"/>
                 <a:cs typeface="Times New Roman" panose="02020603050405020304" pitchFamily="18" charset="0"/>
               </a:rPr>
-              <a:t>possibile gestire gli errori.</a:t>
+              <a:t>chiaro la modalità con la quale funziona la schermata.</a:t>
             </a:r>
           </a:p>
           <a:p>
@@ -13380,14 +13433,14 @@
                 <a:latin typeface="Times New Roman" panose="02020603050405020304" pitchFamily="18" charset="0"/>
                 <a:cs typeface="Times New Roman" panose="02020603050405020304" pitchFamily="18" charset="0"/>
               </a:rPr>
-              <a:t>4.   È </a:t>
+              <a:t>5.   È </a:t>
             </a:r>
             <a:r>
               <a:rPr lang="it-IT" sz="2000" dirty="0">
                 <a:latin typeface="Times New Roman" panose="02020603050405020304" pitchFamily="18" charset="0"/>
                 <a:cs typeface="Times New Roman" panose="02020603050405020304" pitchFamily="18" charset="0"/>
               </a:rPr>
-              <a:t>sempre possibile capire quali operazioni effettuare.</a:t>
+              <a:t>chiaro lo scopo della schermata.</a:t>
             </a:r>
           </a:p>
           <a:p>
@@ -13401,44 +13454,7 @@
             </a:r>
           </a:p>
           <a:p>
-            <a:pPr lvl="0"/>
-            <a:r>
-              <a:rPr lang="it-IT" sz="2000" dirty="0" smtClean="0">
-                <a:latin typeface="Times New Roman" panose="02020603050405020304" pitchFamily="18" charset="0"/>
-                <a:cs typeface="Times New Roman" panose="02020603050405020304" pitchFamily="18" charset="0"/>
-              </a:rPr>
-              <a:t>5.   È </a:t>
-            </a:r>
-            <a:r>
-              <a:rPr lang="it-IT" sz="2000" dirty="0">
-                <a:latin typeface="Times New Roman" panose="02020603050405020304" pitchFamily="18" charset="0"/>
-                <a:cs typeface="Times New Roman" panose="02020603050405020304" pitchFamily="18" charset="0"/>
-              </a:rPr>
-              <a:t>chiaro e/o intuibile lo stato del sistema una volta perso il premio precedentemente vinto.</a:t>
-            </a:r>
-          </a:p>
-          <a:p>
-            <a:pPr algn="ctr"/>
-            <a:r>
-              <a:rPr lang="it-IT" sz="2000" dirty="0">
-                <a:latin typeface="Times New Roman" panose="02020603050405020304" pitchFamily="18" charset="0"/>
-                <a:cs typeface="Times New Roman" panose="02020603050405020304" pitchFamily="18" charset="0"/>
-              </a:rPr>
-              <a:t>1    2    3    4    5</a:t>
-            </a:r>
-          </a:p>
-          <a:p>
-            <a:pPr algn="just"/>
-            <a:endParaRPr lang="it-IT" sz="2000" dirty="0" smtClean="0">
-              <a:latin typeface="Times New Roman" panose="02020603050405020304" pitchFamily="18" charset="0"/>
-              <a:cs typeface="Times New Roman" panose="02020603050405020304" pitchFamily="18" charset="0"/>
-            </a:endParaRPr>
-          </a:p>
-          <a:p>
-            <a:r>
-              <a:rPr lang="it-IT" sz="2600" dirty="0" smtClean="0"/>
-              <a:t> </a:t>
-            </a:r>
+            <a:endParaRPr lang="it-IT" sz="2600" dirty="0" smtClean="0"/>
           </a:p>
         </p:txBody>
       </p:sp>
@@ -13576,21 +13592,49 @@
                 <a:latin typeface="Times New Roman" panose="02020603050405020304" pitchFamily="18" charset="0"/>
                 <a:cs typeface="Times New Roman" panose="02020603050405020304" pitchFamily="18" charset="0"/>
               </a:rPr>
-              <a:t>Task 7 – </a:t>
+              <a:t>Task 6 – Perdere il premio “</a:t>
             </a:r>
             <a:r>
               <a:rPr lang="it-IT" sz="2500" b="1" dirty="0" err="1" smtClean="0">
                 <a:latin typeface="Times New Roman" panose="02020603050405020304" pitchFamily="18" charset="0"/>
                 <a:cs typeface="Times New Roman" panose="02020603050405020304" pitchFamily="18" charset="0"/>
               </a:rPr>
-              <a:t>Forgot</a:t>
+              <a:t>Only</a:t>
             </a:r>
             <a:r>
               <a:rPr lang="it-IT" sz="2500" b="1" dirty="0" smtClean="0">
                 <a:latin typeface="Times New Roman" panose="02020603050405020304" pitchFamily="18" charset="0"/>
                 <a:cs typeface="Times New Roman" panose="02020603050405020304" pitchFamily="18" charset="0"/>
               </a:rPr>
-              <a:t> password e Login</a:t>
+              <a:t> 10 </a:t>
+            </a:r>
+            <a:r>
+              <a:rPr lang="it-IT" sz="2500" b="1" dirty="0" err="1" smtClean="0">
+                <a:latin typeface="Times New Roman" panose="02020603050405020304" pitchFamily="18" charset="0"/>
+                <a:cs typeface="Times New Roman" panose="02020603050405020304" pitchFamily="18" charset="0"/>
+              </a:rPr>
+              <a:t>cigarettes</a:t>
+            </a:r>
+            <a:r>
+              <a:rPr lang="it-IT" sz="2500" b="1" dirty="0" smtClean="0">
+                <a:latin typeface="Times New Roman" panose="02020603050405020304" pitchFamily="18" charset="0"/>
+                <a:cs typeface="Times New Roman" panose="02020603050405020304" pitchFamily="18" charset="0"/>
+              </a:rPr>
+              <a:t> </a:t>
+            </a:r>
+            <a:r>
+              <a:rPr lang="it-IT" sz="2500" b="1" dirty="0" err="1" smtClean="0">
+                <a:latin typeface="Times New Roman" panose="02020603050405020304" pitchFamily="18" charset="0"/>
+                <a:cs typeface="Times New Roman" panose="02020603050405020304" pitchFamily="18" charset="0"/>
+              </a:rPr>
+              <a:t>smoked</a:t>
+            </a:r>
+            <a:r>
+              <a:rPr lang="it-IT" sz="2500" b="1" dirty="0" smtClean="0">
+                <a:latin typeface="Times New Roman" panose="02020603050405020304" pitchFamily="18" charset="0"/>
+                <a:cs typeface="Times New Roman" panose="02020603050405020304" pitchFamily="18" charset="0"/>
+              </a:rPr>
+              <a:t>”</a:t>
             </a:r>
             <a:endParaRPr lang="it-IT" sz="2500" dirty="0" smtClean="0">
               <a:latin typeface="Times New Roman" panose="02020603050405020304" pitchFamily="18" charset="0"/>
@@ -13611,28 +13655,42 @@
                 <a:latin typeface="Times New Roman" panose="02020603050405020304" pitchFamily="18" charset="0"/>
                 <a:cs typeface="Times New Roman" panose="02020603050405020304" pitchFamily="18" charset="0"/>
               </a:rPr>
-              <a:t>1.   È </a:t>
+              <a:t>1.   La </a:t>
             </a:r>
             <a:r>
               <a:rPr lang="it-IT" sz="2000" dirty="0">
                 <a:latin typeface="Times New Roman" panose="02020603050405020304" pitchFamily="18" charset="0"/>
                 <a:cs typeface="Times New Roman" panose="02020603050405020304" pitchFamily="18" charset="0"/>
               </a:rPr>
-              <a:t>facile capire come effettuare il </a:t>
+              <a:t>funzionalità del pulsante “No more </a:t>
             </a:r>
             <a:r>
               <a:rPr lang="it-IT" sz="2000" dirty="0" err="1">
                 <a:latin typeface="Times New Roman" panose="02020603050405020304" pitchFamily="18" charset="0"/>
                 <a:cs typeface="Times New Roman" panose="02020603050405020304" pitchFamily="18" charset="0"/>
               </a:rPr>
-              <a:t>logout</a:t>
+              <a:t>adding</a:t>
             </a:r>
             <a:r>
               <a:rPr lang="it-IT" sz="2000" dirty="0">
                 <a:latin typeface="Times New Roman" panose="02020603050405020304" pitchFamily="18" charset="0"/>
                 <a:cs typeface="Times New Roman" panose="02020603050405020304" pitchFamily="18" charset="0"/>
               </a:rPr>
-              <a:t>.</a:t>
+              <a:t> </a:t>
+            </a:r>
+            <a:r>
+              <a:rPr lang="it-IT" sz="2000" dirty="0" err="1">
+                <a:latin typeface="Times New Roman" panose="02020603050405020304" pitchFamily="18" charset="0"/>
+                <a:cs typeface="Times New Roman" panose="02020603050405020304" pitchFamily="18" charset="0"/>
+              </a:rPr>
+              <a:t>cigarette</a:t>
+            </a:r>
+            <a:r>
+              <a:rPr lang="it-IT" sz="2000" dirty="0">
+                <a:latin typeface="Times New Roman" panose="02020603050405020304" pitchFamily="18" charset="0"/>
+                <a:cs typeface="Times New Roman" panose="02020603050405020304" pitchFamily="18" charset="0"/>
+              </a:rPr>
+              <a:t>” è comprensibile.</a:t>
             </a:r>
           </a:p>
           <a:p>
@@ -13706,42 +13764,41 @@
                 <a:latin typeface="Times New Roman" panose="02020603050405020304" pitchFamily="18" charset="0"/>
                 <a:cs typeface="Times New Roman" panose="02020603050405020304" pitchFamily="18" charset="0"/>
               </a:rPr>
-              <a:t>4.   Sono </a:t>
+              <a:t>4.   È </a:t>
             </a:r>
             <a:r>
               <a:rPr lang="it-IT" sz="2000" dirty="0">
                 <a:latin typeface="Times New Roman" panose="02020603050405020304" pitchFamily="18" charset="0"/>
                 <a:cs typeface="Times New Roman" panose="02020603050405020304" pitchFamily="18" charset="0"/>
               </a:rPr>
-              <a:t>chiare le modalità di funzionamento del pulsante “</a:t>
-            </a:r>
-            <a:r>
-              <a:rPr lang="it-IT" sz="2000" dirty="0" err="1">
-                <a:latin typeface="Times New Roman" panose="02020603050405020304" pitchFamily="18" charset="0"/>
-                <a:cs typeface="Times New Roman" panose="02020603050405020304" pitchFamily="18" charset="0"/>
-              </a:rPr>
-              <a:t>Forgot</a:t>
-            </a:r>
+              <a:t>sempre possibile capire quali operazioni effettuare.</a:t>
+            </a:r>
+          </a:p>
+          <a:p>
+            <a:pPr algn="ctr"/>
             <a:r>
               <a:rPr lang="it-IT" sz="2000" dirty="0">
                 <a:latin typeface="Times New Roman" panose="02020603050405020304" pitchFamily="18" charset="0"/>
                 <a:cs typeface="Times New Roman" panose="02020603050405020304" pitchFamily="18" charset="0"/>
               </a:rPr>
-              <a:t> </a:t>
-            </a:r>
-            <a:r>
-              <a:rPr lang="it-IT" sz="2000" dirty="0" err="1">
-                <a:latin typeface="Times New Roman" panose="02020603050405020304" pitchFamily="18" charset="0"/>
-                <a:cs typeface="Times New Roman" panose="02020603050405020304" pitchFamily="18" charset="0"/>
-              </a:rPr>
-              <a:t>your</a:t>
+              <a:t>1    2    3    4    5</a:t>
+            </a:r>
+          </a:p>
+          <a:p>
+            <a:pPr lvl="0"/>
+            <a:r>
+              <a:rPr lang="it-IT" sz="2000" dirty="0" smtClean="0">
+                <a:latin typeface="Times New Roman" panose="02020603050405020304" pitchFamily="18" charset="0"/>
+                <a:cs typeface="Times New Roman" panose="02020603050405020304" pitchFamily="18" charset="0"/>
+              </a:rPr>
+              <a:t>5.   È </a:t>
             </a:r>
             <a:r>
               <a:rPr lang="it-IT" sz="2000" dirty="0">
                 <a:latin typeface="Times New Roman" panose="02020603050405020304" pitchFamily="18" charset="0"/>
                 <a:cs typeface="Times New Roman" panose="02020603050405020304" pitchFamily="18" charset="0"/>
               </a:rPr>
-              <a:t> password?”.</a:t>
+              <a:t>chiaro e/o intuibile lo stato del sistema una volta perso il premio precedentemente vinto.</a:t>
             </a:r>
           </a:p>
           <a:p>
@@ -13755,61 +13812,17 @@
             </a:r>
           </a:p>
           <a:p>
-            <a:pPr lvl="0"/>
-            <a:r>
-              <a:rPr lang="it-IT" sz="2000" dirty="0" smtClean="0">
-                <a:latin typeface="Times New Roman" panose="02020603050405020304" pitchFamily="18" charset="0"/>
-                <a:cs typeface="Times New Roman" panose="02020603050405020304" pitchFamily="18" charset="0"/>
-              </a:rPr>
-              <a:t>5.   È </a:t>
-            </a:r>
-            <a:r>
-              <a:rPr lang="it-IT" sz="2000" dirty="0">
-                <a:latin typeface="Times New Roman" panose="02020603050405020304" pitchFamily="18" charset="0"/>
-                <a:cs typeface="Times New Roman" panose="02020603050405020304" pitchFamily="18" charset="0"/>
-              </a:rPr>
-              <a:t>sempre chiaro quali campi devono essere riempiti.</a:t>
-            </a:r>
-          </a:p>
-          <a:p>
-            <a:pPr algn="ctr"/>
-            <a:r>
-              <a:rPr lang="it-IT" sz="2000" dirty="0">
-                <a:latin typeface="Times New Roman" panose="02020603050405020304" pitchFamily="18" charset="0"/>
-                <a:cs typeface="Times New Roman" panose="02020603050405020304" pitchFamily="18" charset="0"/>
-              </a:rPr>
-              <a:t>1    2    3    4    5</a:t>
-            </a:r>
-          </a:p>
-          <a:p>
-            <a:pPr lvl="0"/>
-            <a:r>
-              <a:rPr lang="it-IT" sz="2000" dirty="0" smtClean="0">
-                <a:latin typeface="Times New Roman" panose="02020603050405020304" pitchFamily="18" charset="0"/>
-                <a:cs typeface="Times New Roman" panose="02020603050405020304" pitchFamily="18" charset="0"/>
-              </a:rPr>
-              <a:t>6.   La </a:t>
-            </a:r>
-            <a:r>
-              <a:rPr lang="it-IT" sz="2000" dirty="0">
-                <a:latin typeface="Times New Roman" panose="02020603050405020304" pitchFamily="18" charset="0"/>
-                <a:cs typeface="Times New Roman" panose="02020603050405020304" pitchFamily="18" charset="0"/>
-              </a:rPr>
-              <a:t>modalità del funzionamento del pulsante “Login” è comprensibile.</a:t>
-            </a:r>
-          </a:p>
-          <a:p>
-            <a:pPr algn="ctr"/>
-            <a:r>
-              <a:rPr lang="it-IT" sz="2000" dirty="0">
-                <a:latin typeface="Times New Roman" panose="02020603050405020304" pitchFamily="18" charset="0"/>
-                <a:cs typeface="Times New Roman" panose="02020603050405020304" pitchFamily="18" charset="0"/>
-              </a:rPr>
-              <a:t>1    2    3    4    5</a:t>
-            </a:r>
-          </a:p>
-          <a:p>
-            <a:endParaRPr lang="it-IT" sz="2600" dirty="0" smtClean="0"/>
+            <a:pPr algn="just"/>
+            <a:endParaRPr lang="it-IT" sz="2000" dirty="0" smtClean="0">
+              <a:latin typeface="Times New Roman" panose="02020603050405020304" pitchFamily="18" charset="0"/>
+              <a:cs typeface="Times New Roman" panose="02020603050405020304" pitchFamily="18" charset="0"/>
+            </a:endParaRPr>
+          </a:p>
+          <a:p>
+            <a:r>
+              <a:rPr lang="it-IT" sz="2600" dirty="0" smtClean="0"/>
+              <a:t> </a:t>
+            </a:r>
           </a:p>
         </p:txBody>
       </p:sp>
@@ -14008,6 +14021,377 @@
       </p:par>
     </p:tnLst>
   </p:timing>
+</p:sld>
+</file>
+
+<file path=ppt/slides/slide40.xml><?xml version="1.0" encoding="utf-8"?>
+<p:sld xmlns:a="http://schemas.openxmlformats.org/drawingml/2006/main" xmlns:r="http://schemas.openxmlformats.org/officeDocument/2006/relationships" xmlns:p="http://schemas.openxmlformats.org/presentationml/2006/main">
+  <p:cSld>
+    <p:spTree>
+      <p:nvGrpSpPr>
+        <p:cNvPr id="1" name=""/>
+        <p:cNvGrpSpPr/>
+        <p:nvPr/>
+      </p:nvGrpSpPr>
+      <p:grpSpPr>
+        <a:xfrm>
+          <a:off x="0" y="0"/>
+          <a:ext cx="0" cy="0"/>
+          <a:chOff x="0" y="0"/>
+          <a:chExt cx="0" cy="0"/>
+        </a:xfrm>
+      </p:grpSpPr>
+      <p:sp>
+        <p:nvSpPr>
+          <p:cNvPr id="5" name="Titolo 1"/>
+          <p:cNvSpPr>
+            <a:spLocks noGrp="1"/>
+          </p:cNvSpPr>
+          <p:nvPr>
+            <p:ph type="title"/>
+          </p:nvPr>
+        </p:nvSpPr>
+        <p:spPr>
+          <a:xfrm>
+            <a:off x="628650" y="444137"/>
+            <a:ext cx="7886700" cy="653143"/>
+          </a:xfrm>
+        </p:spPr>
+        <p:txBody>
+          <a:bodyPr>
+            <a:normAutofit/>
+          </a:bodyPr>
+          <a:lstStyle/>
+          <a:p>
+            <a:r>
+              <a:rPr lang="it-IT" sz="2800" b="1" dirty="0" err="1" smtClean="0">
+                <a:latin typeface="Times New Roman" panose="02020603050405020304" pitchFamily="18" charset="0"/>
+                <a:cs typeface="Times New Roman" panose="02020603050405020304" pitchFamily="18" charset="0"/>
+              </a:rPr>
+              <a:t>User</a:t>
+            </a:r>
+            <a:r>
+              <a:rPr lang="it-IT" sz="2800" b="1" dirty="0" smtClean="0">
+                <a:latin typeface="Times New Roman" panose="02020603050405020304" pitchFamily="18" charset="0"/>
+                <a:cs typeface="Times New Roman" panose="02020603050405020304" pitchFamily="18" charset="0"/>
+              </a:rPr>
+              <a:t> </a:t>
+            </a:r>
+            <a:r>
+              <a:rPr lang="it-IT" sz="2800" b="1" dirty="0" err="1" smtClean="0">
+                <a:latin typeface="Times New Roman" panose="02020603050405020304" pitchFamily="18" charset="0"/>
+                <a:cs typeface="Times New Roman" panose="02020603050405020304" pitchFamily="18" charset="0"/>
+              </a:rPr>
+              <a:t>testing</a:t>
+            </a:r>
+            <a:r>
+              <a:rPr lang="it-IT" sz="2800" b="1" dirty="0" smtClean="0">
+                <a:latin typeface="Times New Roman" panose="02020603050405020304" pitchFamily="18" charset="0"/>
+                <a:cs typeface="Times New Roman" panose="02020603050405020304" pitchFamily="18" charset="0"/>
+              </a:rPr>
+              <a:t> – </a:t>
+            </a:r>
+            <a:r>
+              <a:rPr lang="it-IT" sz="2800" b="1" i="1" dirty="0" err="1" smtClean="0">
+                <a:latin typeface="Times New Roman" panose="02020603050405020304" pitchFamily="18" charset="0"/>
+                <a:cs typeface="Times New Roman" panose="02020603050405020304" pitchFamily="18" charset="0"/>
+              </a:rPr>
+              <a:t>After</a:t>
+            </a:r>
+            <a:r>
+              <a:rPr lang="it-IT" sz="2800" b="1" i="1" dirty="0" smtClean="0">
+                <a:latin typeface="Times New Roman" panose="02020603050405020304" pitchFamily="18" charset="0"/>
+                <a:cs typeface="Times New Roman" panose="02020603050405020304" pitchFamily="18" charset="0"/>
+              </a:rPr>
+              <a:t> the test</a:t>
+            </a:r>
+            <a:endParaRPr lang="it-IT" sz="2800" i="1" dirty="0"/>
+          </a:p>
+        </p:txBody>
+      </p:sp>
+      <p:sp>
+        <p:nvSpPr>
+          <p:cNvPr id="8" name="Segnaposto contenuto 2"/>
+          <p:cNvSpPr txBox="1">
+            <a:spLocks/>
+          </p:cNvSpPr>
+          <p:nvPr/>
+        </p:nvSpPr>
+        <p:spPr>
+          <a:xfrm>
+            <a:off x="628650" y="1254034"/>
+            <a:ext cx="7886700" cy="5301311"/>
+          </a:xfrm>
+          <a:prstGeom prst="rect">
+            <a:avLst/>
+          </a:prstGeom>
+        </p:spPr>
+        <p:txBody>
+          <a:bodyPr vert="horz" lIns="91440" tIns="45720" rIns="91440" bIns="45720" rtlCol="0">
+            <a:normAutofit/>
+          </a:bodyPr>
+          <a:lstStyle/>
+          <a:p>
+            <a:pPr lvl="0" algn="ctr">
+              <a:lnSpc>
+                <a:spcPct val="120000"/>
+              </a:lnSpc>
+              <a:spcBef>
+                <a:spcPts val="1000"/>
+              </a:spcBef>
+            </a:pPr>
+            <a:r>
+              <a:rPr lang="it-IT" sz="2500" b="1" dirty="0" smtClean="0">
+                <a:latin typeface="Times New Roman" panose="02020603050405020304" pitchFamily="18" charset="0"/>
+                <a:cs typeface="Times New Roman" panose="02020603050405020304" pitchFamily="18" charset="0"/>
+              </a:rPr>
+              <a:t>Task 7 – </a:t>
+            </a:r>
+            <a:r>
+              <a:rPr lang="it-IT" sz="2500" b="1" dirty="0" err="1" smtClean="0">
+                <a:latin typeface="Times New Roman" panose="02020603050405020304" pitchFamily="18" charset="0"/>
+                <a:cs typeface="Times New Roman" panose="02020603050405020304" pitchFamily="18" charset="0"/>
+              </a:rPr>
+              <a:t>Forgot</a:t>
+            </a:r>
+            <a:r>
+              <a:rPr lang="it-IT" sz="2500" b="1" dirty="0" smtClean="0">
+                <a:latin typeface="Times New Roman" panose="02020603050405020304" pitchFamily="18" charset="0"/>
+                <a:cs typeface="Times New Roman" panose="02020603050405020304" pitchFamily="18" charset="0"/>
+              </a:rPr>
+              <a:t> password e Login</a:t>
+            </a:r>
+            <a:endParaRPr lang="it-IT" sz="2500" dirty="0" smtClean="0">
+              <a:latin typeface="Times New Roman" panose="02020603050405020304" pitchFamily="18" charset="0"/>
+              <a:cs typeface="Times New Roman" panose="02020603050405020304" pitchFamily="18" charset="0"/>
+            </a:endParaRPr>
+          </a:p>
+          <a:p>
+            <a:pPr algn="just"/>
+            <a:endParaRPr lang="it-IT" sz="2000" dirty="0" smtClean="0">
+              <a:latin typeface="Times New Roman" panose="02020603050405020304" pitchFamily="18" charset="0"/>
+              <a:cs typeface="Times New Roman" panose="02020603050405020304" pitchFamily="18" charset="0"/>
+            </a:endParaRPr>
+          </a:p>
+          <a:p>
+            <a:pPr lvl="0"/>
+            <a:r>
+              <a:rPr lang="it-IT" sz="2000" dirty="0" smtClean="0">
+                <a:latin typeface="Times New Roman" panose="02020603050405020304" pitchFamily="18" charset="0"/>
+                <a:cs typeface="Times New Roman" panose="02020603050405020304" pitchFamily="18" charset="0"/>
+              </a:rPr>
+              <a:t>1.   È </a:t>
+            </a:r>
+            <a:r>
+              <a:rPr lang="it-IT" sz="2000" dirty="0">
+                <a:latin typeface="Times New Roman" panose="02020603050405020304" pitchFamily="18" charset="0"/>
+                <a:cs typeface="Times New Roman" panose="02020603050405020304" pitchFamily="18" charset="0"/>
+              </a:rPr>
+              <a:t>facile capire come effettuare il </a:t>
+            </a:r>
+            <a:r>
+              <a:rPr lang="it-IT" sz="2000" dirty="0" err="1">
+                <a:latin typeface="Times New Roman" panose="02020603050405020304" pitchFamily="18" charset="0"/>
+                <a:cs typeface="Times New Roman" panose="02020603050405020304" pitchFamily="18" charset="0"/>
+              </a:rPr>
+              <a:t>logout</a:t>
+            </a:r>
+            <a:r>
+              <a:rPr lang="it-IT" sz="2000" dirty="0">
+                <a:latin typeface="Times New Roman" panose="02020603050405020304" pitchFamily="18" charset="0"/>
+                <a:cs typeface="Times New Roman" panose="02020603050405020304" pitchFamily="18" charset="0"/>
+              </a:rPr>
+              <a:t>.</a:t>
+            </a:r>
+          </a:p>
+          <a:p>
+            <a:pPr algn="ctr"/>
+            <a:r>
+              <a:rPr lang="it-IT" sz="2000" dirty="0">
+                <a:latin typeface="Times New Roman" panose="02020603050405020304" pitchFamily="18" charset="0"/>
+                <a:cs typeface="Times New Roman" panose="02020603050405020304" pitchFamily="18" charset="0"/>
+              </a:rPr>
+              <a:t>1    2    3    4    5</a:t>
+            </a:r>
+          </a:p>
+          <a:p>
+            <a:pPr lvl="0"/>
+            <a:r>
+              <a:rPr lang="it-IT" sz="2000" dirty="0" smtClean="0">
+                <a:latin typeface="Times New Roman" panose="02020603050405020304" pitchFamily="18" charset="0"/>
+                <a:cs typeface="Times New Roman" panose="02020603050405020304" pitchFamily="18" charset="0"/>
+              </a:rPr>
+              <a:t>2.   I </a:t>
+            </a:r>
+            <a:r>
+              <a:rPr lang="it-IT" sz="2000" dirty="0">
+                <a:latin typeface="Times New Roman" panose="02020603050405020304" pitchFamily="18" charset="0"/>
+                <a:cs typeface="Times New Roman" panose="02020603050405020304" pitchFamily="18" charset="0"/>
+              </a:rPr>
+              <a:t>collegamenti fra le schermate sono coerenti.</a:t>
+            </a:r>
+          </a:p>
+          <a:p>
+            <a:pPr algn="ctr"/>
+            <a:r>
+              <a:rPr lang="it-IT" sz="2000" dirty="0">
+                <a:latin typeface="Times New Roman" panose="02020603050405020304" pitchFamily="18" charset="0"/>
+                <a:cs typeface="Times New Roman" panose="02020603050405020304" pitchFamily="18" charset="0"/>
+              </a:rPr>
+              <a:t>1    2    3    4    5</a:t>
+            </a:r>
+          </a:p>
+          <a:p>
+            <a:pPr lvl="0"/>
+            <a:r>
+              <a:rPr lang="it-IT" sz="2000" dirty="0" smtClean="0">
+                <a:latin typeface="Times New Roman" panose="02020603050405020304" pitchFamily="18" charset="0"/>
+                <a:cs typeface="Times New Roman" panose="02020603050405020304" pitchFamily="18" charset="0"/>
+              </a:rPr>
+              <a:t>3.   È </a:t>
+            </a:r>
+            <a:r>
+              <a:rPr lang="it-IT" sz="2000" dirty="0">
+                <a:latin typeface="Times New Roman" panose="02020603050405020304" pitchFamily="18" charset="0"/>
+                <a:cs typeface="Times New Roman" panose="02020603050405020304" pitchFamily="18" charset="0"/>
+              </a:rPr>
+              <a:t>possibile gestire gli errori.</a:t>
+            </a:r>
+          </a:p>
+          <a:p>
+            <a:pPr algn="ctr"/>
+            <a:r>
+              <a:rPr lang="it-IT" sz="2000" dirty="0">
+                <a:latin typeface="Times New Roman" panose="02020603050405020304" pitchFamily="18" charset="0"/>
+                <a:cs typeface="Times New Roman" panose="02020603050405020304" pitchFamily="18" charset="0"/>
+              </a:rPr>
+              <a:t>1    2    3    4    5</a:t>
+            </a:r>
+          </a:p>
+          <a:p>
+            <a:pPr lvl="0"/>
+            <a:r>
+              <a:rPr lang="it-IT" sz="2000" dirty="0" smtClean="0">
+                <a:latin typeface="Times New Roman" panose="02020603050405020304" pitchFamily="18" charset="0"/>
+                <a:cs typeface="Times New Roman" panose="02020603050405020304" pitchFamily="18" charset="0"/>
+              </a:rPr>
+              <a:t>4.   Sono </a:t>
+            </a:r>
+            <a:r>
+              <a:rPr lang="it-IT" sz="2000" dirty="0">
+                <a:latin typeface="Times New Roman" panose="02020603050405020304" pitchFamily="18" charset="0"/>
+                <a:cs typeface="Times New Roman" panose="02020603050405020304" pitchFamily="18" charset="0"/>
+              </a:rPr>
+              <a:t>chiare le modalità di funzionamento del pulsante “</a:t>
+            </a:r>
+            <a:r>
+              <a:rPr lang="it-IT" sz="2000" dirty="0" err="1">
+                <a:latin typeface="Times New Roman" panose="02020603050405020304" pitchFamily="18" charset="0"/>
+                <a:cs typeface="Times New Roman" panose="02020603050405020304" pitchFamily="18" charset="0"/>
+              </a:rPr>
+              <a:t>Forgot</a:t>
+            </a:r>
+            <a:r>
+              <a:rPr lang="it-IT" sz="2000" dirty="0">
+                <a:latin typeface="Times New Roman" panose="02020603050405020304" pitchFamily="18" charset="0"/>
+                <a:cs typeface="Times New Roman" panose="02020603050405020304" pitchFamily="18" charset="0"/>
+              </a:rPr>
+              <a:t> </a:t>
+            </a:r>
+            <a:r>
+              <a:rPr lang="it-IT" sz="2000" dirty="0" err="1">
+                <a:latin typeface="Times New Roman" panose="02020603050405020304" pitchFamily="18" charset="0"/>
+                <a:cs typeface="Times New Roman" panose="02020603050405020304" pitchFamily="18" charset="0"/>
+              </a:rPr>
+              <a:t>your</a:t>
+            </a:r>
+            <a:r>
+              <a:rPr lang="it-IT" sz="2000" dirty="0">
+                <a:latin typeface="Times New Roman" panose="02020603050405020304" pitchFamily="18" charset="0"/>
+                <a:cs typeface="Times New Roman" panose="02020603050405020304" pitchFamily="18" charset="0"/>
+              </a:rPr>
+              <a:t> password?”.</a:t>
+            </a:r>
+          </a:p>
+          <a:p>
+            <a:pPr algn="ctr"/>
+            <a:r>
+              <a:rPr lang="it-IT" sz="2000" dirty="0">
+                <a:latin typeface="Times New Roman" panose="02020603050405020304" pitchFamily="18" charset="0"/>
+                <a:cs typeface="Times New Roman" panose="02020603050405020304" pitchFamily="18" charset="0"/>
+              </a:rPr>
+              <a:t>1    2    3    4    5</a:t>
+            </a:r>
+          </a:p>
+          <a:p>
+            <a:pPr lvl="0"/>
+            <a:r>
+              <a:rPr lang="it-IT" sz="2000" dirty="0" smtClean="0">
+                <a:latin typeface="Times New Roman" panose="02020603050405020304" pitchFamily="18" charset="0"/>
+                <a:cs typeface="Times New Roman" panose="02020603050405020304" pitchFamily="18" charset="0"/>
+              </a:rPr>
+              <a:t>5.   È </a:t>
+            </a:r>
+            <a:r>
+              <a:rPr lang="it-IT" sz="2000" dirty="0">
+                <a:latin typeface="Times New Roman" panose="02020603050405020304" pitchFamily="18" charset="0"/>
+                <a:cs typeface="Times New Roman" panose="02020603050405020304" pitchFamily="18" charset="0"/>
+              </a:rPr>
+              <a:t>sempre chiaro quali campi devono essere riempiti.</a:t>
+            </a:r>
+          </a:p>
+          <a:p>
+            <a:pPr algn="ctr"/>
+            <a:r>
+              <a:rPr lang="it-IT" sz="2000" dirty="0">
+                <a:latin typeface="Times New Roman" panose="02020603050405020304" pitchFamily="18" charset="0"/>
+                <a:cs typeface="Times New Roman" panose="02020603050405020304" pitchFamily="18" charset="0"/>
+              </a:rPr>
+              <a:t>1    2    3    4    5</a:t>
+            </a:r>
+          </a:p>
+          <a:p>
+            <a:pPr lvl="0"/>
+            <a:r>
+              <a:rPr lang="it-IT" sz="2000" dirty="0" smtClean="0">
+                <a:latin typeface="Times New Roman" panose="02020603050405020304" pitchFamily="18" charset="0"/>
+                <a:cs typeface="Times New Roman" panose="02020603050405020304" pitchFamily="18" charset="0"/>
+              </a:rPr>
+              <a:t>6.   La </a:t>
+            </a:r>
+            <a:r>
+              <a:rPr lang="it-IT" sz="2000" dirty="0">
+                <a:latin typeface="Times New Roman" panose="02020603050405020304" pitchFamily="18" charset="0"/>
+                <a:cs typeface="Times New Roman" panose="02020603050405020304" pitchFamily="18" charset="0"/>
+              </a:rPr>
+              <a:t>modalità del funzionamento del pulsante “Login” è comprensibile.</a:t>
+            </a:r>
+          </a:p>
+          <a:p>
+            <a:pPr algn="ctr"/>
+            <a:r>
+              <a:rPr lang="it-IT" sz="2000" dirty="0">
+                <a:latin typeface="Times New Roman" panose="02020603050405020304" pitchFamily="18" charset="0"/>
+                <a:cs typeface="Times New Roman" panose="02020603050405020304" pitchFamily="18" charset="0"/>
+              </a:rPr>
+              <a:t>1    2    3    4    5</a:t>
+            </a:r>
+          </a:p>
+          <a:p>
+            <a:endParaRPr lang="it-IT" sz="2600" dirty="0" smtClean="0"/>
+          </a:p>
+        </p:txBody>
+      </p:sp>
+    </p:spTree>
+    <p:extLst>
+      <p:ext uri="{BB962C8B-B14F-4D97-AF65-F5344CB8AC3E}">
+        <p14:creationId xmlns:p14="http://schemas.microsoft.com/office/powerpoint/2010/main" val="2442419145"/>
+      </p:ext>
+    </p:extLst>
+  </p:cSld>
+  <p:clrMapOvr>
+    <a:masterClrMapping/>
+  </p:clrMapOvr>
 </p:sld>
 </file>
 

</xml_diff>